<commit_message>
vault backup: 2024-05-24 11:47:39
</commit_message>
<xml_diff>
--- a/06-ppt/discussion/0524 - 副本.pptx
+++ b/06-ppt/discussion/0524 - 副本.pptx
@@ -1,16 +1,16 @@
 
 <file path=ppt/presentation.xml><?xml version="1.0" encoding="utf-8"?>
-<p:presentation xmlns:a="http://schemas.openxmlformats.org/drawingml/2006/main" xmlns:r="http://schemas.openxmlformats.org/officeDocument/2006/relationships" xmlns:p="http://schemas.openxmlformats.org/presentationml/2006/main" saveSubsetFonts="1">
+<p:presentation xmlns:a="http://schemas.openxmlformats.org/drawingml/2006/main" xmlns:r="http://schemas.openxmlformats.org/officeDocument/2006/relationships" xmlns:p="http://schemas.openxmlformats.org/presentationml/2006/main">
   <p:sldMasterIdLst>
     <p:sldMasterId id="2147483648" r:id="rId1"/>
   </p:sldMasterIdLst>
   <p:sldIdLst>
-    <p:sldId id="256" r:id="rId2"/>
-    <p:sldId id="257" r:id="rId3"/>
-    <p:sldId id="259" r:id="rId4"/>
-    <p:sldId id="260" r:id="rId5"/>
-    <p:sldId id="261" r:id="rId6"/>
-    <p:sldId id="262" r:id="rId7"/>
+    <p:sldId id="256" r:id="rId3"/>
+    <p:sldId id="257" r:id="rId4"/>
+    <p:sldId id="259" r:id="rId5"/>
+    <p:sldId id="260" r:id="rId6"/>
+    <p:sldId id="261" r:id="rId7"/>
+    <p:sldId id="262" r:id="rId8"/>
   </p:sldIdLst>
   <p:sldSz cx="12192000" cy="6858000"/>
   <p:notesSz cx="6858000" cy="9144000"/>
@@ -147,13 +147,7 @@
       </p:grpSpPr>
       <p:sp>
         <p:nvSpPr>
-          <p:cNvPr id="2" name="标题 1">
-            <a:extLst>
-              <a:ext uri="{FF2B5EF4-FFF2-40B4-BE49-F238E27FC236}">
-                <a16:creationId xmlns:a16="http://schemas.microsoft.com/office/drawing/2014/main" id="{C7295FFD-9B78-CCC9-AA78-73074901FD21}"/>
-              </a:ext>
-            </a:extLst>
-          </p:cNvPr>
+          <p:cNvPr id="2" name="标题 1"/>
           <p:cNvSpPr>
             <a:spLocks noGrp="1"/>
           </p:cNvSpPr>
@@ -179,18 +173,13 @@
               <a:rPr lang="zh-CN" altLang="en-US"/>
               <a:t>单击此处编辑母版标题样式</a:t>
             </a:r>
-          </a:p>
-        </p:txBody>
-      </p:sp>
-      <p:sp>
-        <p:nvSpPr>
-          <p:cNvPr id="3" name="副标题 2">
-            <a:extLst>
-              <a:ext uri="{FF2B5EF4-FFF2-40B4-BE49-F238E27FC236}">
-                <a16:creationId xmlns:a16="http://schemas.microsoft.com/office/drawing/2014/main" id="{125FBC7A-779A-210C-2D8A-F93B308E3996}"/>
-              </a:ext>
-            </a:extLst>
-          </p:cNvPr>
+            <a:endParaRPr lang="zh-CN" altLang="en-US"/>
+          </a:p>
+        </p:txBody>
+      </p:sp>
+      <p:sp>
+        <p:nvSpPr>
+          <p:cNvPr id="3" name="副标题 2"/>
           <p:cNvSpPr>
             <a:spLocks noGrp="1"/>
           </p:cNvSpPr>
@@ -249,18 +238,13 @@
               <a:rPr lang="zh-CN" altLang="en-US"/>
               <a:t>单击此处编辑母版副标题样式</a:t>
             </a:r>
-          </a:p>
-        </p:txBody>
-      </p:sp>
-      <p:sp>
-        <p:nvSpPr>
-          <p:cNvPr id="4" name="日期占位符 3">
-            <a:extLst>
-              <a:ext uri="{FF2B5EF4-FFF2-40B4-BE49-F238E27FC236}">
-                <a16:creationId xmlns:a16="http://schemas.microsoft.com/office/drawing/2014/main" id="{8A8DE045-686E-6E60-D732-9637FFA3A0A8}"/>
-              </a:ext>
-            </a:extLst>
-          </p:cNvPr>
+            <a:endParaRPr lang="zh-CN" altLang="en-US"/>
+          </a:p>
+        </p:txBody>
+      </p:sp>
+      <p:sp>
+        <p:nvSpPr>
+          <p:cNvPr id="4" name="日期占位符 3"/>
           <p:cNvSpPr>
             <a:spLocks noGrp="1"/>
           </p:cNvSpPr>
@@ -275,7 +259,6 @@
           <a:p>
             <a:fld id="{51FD5836-1B78-4E70-983F-F8F353C30F27}" type="datetimeFigureOut">
               <a:rPr lang="zh-CN" altLang="en-US" smtClean="0"/>
-              <a:t>2024/5/23</a:t>
             </a:fld>
             <a:endParaRPr lang="zh-CN" altLang="en-US"/>
           </a:p>
@@ -283,13 +266,7 @@
       </p:sp>
       <p:sp>
         <p:nvSpPr>
-          <p:cNvPr id="5" name="页脚占位符 4">
-            <a:extLst>
-              <a:ext uri="{FF2B5EF4-FFF2-40B4-BE49-F238E27FC236}">
-                <a16:creationId xmlns:a16="http://schemas.microsoft.com/office/drawing/2014/main" id="{9ED44D9A-4775-32A5-A51D-E228CF5059C8}"/>
-              </a:ext>
-            </a:extLst>
-          </p:cNvPr>
+          <p:cNvPr id="5" name="页脚占位符 4"/>
           <p:cNvSpPr>
             <a:spLocks noGrp="1"/>
           </p:cNvSpPr>
@@ -308,13 +285,7 @@
       </p:sp>
       <p:sp>
         <p:nvSpPr>
-          <p:cNvPr id="6" name="灯片编号占位符 5">
-            <a:extLst>
-              <a:ext uri="{FF2B5EF4-FFF2-40B4-BE49-F238E27FC236}">
-                <a16:creationId xmlns:a16="http://schemas.microsoft.com/office/drawing/2014/main" id="{8EA11A5A-1AA0-08B5-C8B8-51D7D1C90CA5}"/>
-              </a:ext>
-            </a:extLst>
-          </p:cNvPr>
+          <p:cNvPr id="6" name="灯片编号占位符 5"/>
           <p:cNvSpPr>
             <a:spLocks noGrp="1"/>
           </p:cNvSpPr>
@@ -329,18 +300,12 @@
           <a:p>
             <a:fld id="{AB80B9A9-C03D-4F64-ADE2-7C0EC2978D5F}" type="slidenum">
               <a:rPr lang="zh-CN" altLang="en-US" smtClean="0"/>
-              <a:t>‹#›</a:t>
             </a:fld>
             <a:endParaRPr lang="zh-CN" altLang="en-US"/>
           </a:p>
         </p:txBody>
       </p:sp>
     </p:spTree>
-    <p:extLst>
-      <p:ext uri="{BB962C8B-B14F-4D97-AF65-F5344CB8AC3E}">
-        <p14:creationId xmlns:p14="http://schemas.microsoft.com/office/powerpoint/2010/main" val="1132969275"/>
-      </p:ext>
-    </p:extLst>
   </p:cSld>
   <p:clrMapOvr>
     <a:masterClrMapping/>
@@ -367,13 +332,7 @@
       </p:grpSpPr>
       <p:sp>
         <p:nvSpPr>
-          <p:cNvPr id="2" name="标题 1">
-            <a:extLst>
-              <a:ext uri="{FF2B5EF4-FFF2-40B4-BE49-F238E27FC236}">
-                <a16:creationId xmlns:a16="http://schemas.microsoft.com/office/drawing/2014/main" id="{F94FE26E-FFE9-EE48-81DB-6623CA7A8565}"/>
-              </a:ext>
-            </a:extLst>
-          </p:cNvPr>
+          <p:cNvPr id="2" name="标题 1"/>
           <p:cNvSpPr>
             <a:spLocks noGrp="1"/>
           </p:cNvSpPr>
@@ -390,18 +349,13 @@
               <a:rPr lang="zh-CN" altLang="en-US"/>
               <a:t>单击此处编辑母版标题样式</a:t>
             </a:r>
-          </a:p>
-        </p:txBody>
-      </p:sp>
-      <p:sp>
-        <p:nvSpPr>
-          <p:cNvPr id="3" name="竖排文字占位符 2">
-            <a:extLst>
-              <a:ext uri="{FF2B5EF4-FFF2-40B4-BE49-F238E27FC236}">
-                <a16:creationId xmlns:a16="http://schemas.microsoft.com/office/drawing/2014/main" id="{FF99A8F4-A15B-1864-570B-9C53CE1DA1A5}"/>
-              </a:ext>
-            </a:extLst>
-          </p:cNvPr>
+            <a:endParaRPr lang="zh-CN" altLang="en-US"/>
+          </a:p>
+        </p:txBody>
+      </p:sp>
+      <p:sp>
+        <p:nvSpPr>
+          <p:cNvPr id="3" name="竖排文字占位符 2"/>
           <p:cNvSpPr>
             <a:spLocks noGrp="1"/>
           </p:cNvSpPr>
@@ -419,6 +373,7 @@
               <a:rPr lang="zh-CN" altLang="en-US"/>
               <a:t>单击此处编辑母版文本样式</a:t>
             </a:r>
+            <a:endParaRPr lang="zh-CN" altLang="en-US"/>
           </a:p>
           <a:p>
             <a:pPr lvl="1"/>
@@ -426,6 +381,7 @@
               <a:rPr lang="zh-CN" altLang="en-US"/>
               <a:t>二级</a:t>
             </a:r>
+            <a:endParaRPr lang="zh-CN" altLang="en-US"/>
           </a:p>
           <a:p>
             <a:pPr lvl="2"/>
@@ -433,6 +389,7 @@
               <a:rPr lang="zh-CN" altLang="en-US"/>
               <a:t>三级</a:t>
             </a:r>
+            <a:endParaRPr lang="zh-CN" altLang="en-US"/>
           </a:p>
           <a:p>
             <a:pPr lvl="3"/>
@@ -440,6 +397,7 @@
               <a:rPr lang="zh-CN" altLang="en-US"/>
               <a:t>四级</a:t>
             </a:r>
+            <a:endParaRPr lang="zh-CN" altLang="en-US"/>
           </a:p>
           <a:p>
             <a:pPr lvl="4"/>
@@ -447,18 +405,13 @@
               <a:rPr lang="zh-CN" altLang="en-US"/>
               <a:t>五级</a:t>
             </a:r>
-          </a:p>
-        </p:txBody>
-      </p:sp>
-      <p:sp>
-        <p:nvSpPr>
-          <p:cNvPr id="4" name="日期占位符 3">
-            <a:extLst>
-              <a:ext uri="{FF2B5EF4-FFF2-40B4-BE49-F238E27FC236}">
-                <a16:creationId xmlns:a16="http://schemas.microsoft.com/office/drawing/2014/main" id="{2DB1D44A-2758-FEBA-DDB6-4BB4FF5F07C1}"/>
-              </a:ext>
-            </a:extLst>
-          </p:cNvPr>
+            <a:endParaRPr lang="zh-CN" altLang="en-US"/>
+          </a:p>
+        </p:txBody>
+      </p:sp>
+      <p:sp>
+        <p:nvSpPr>
+          <p:cNvPr id="4" name="日期占位符 3"/>
           <p:cNvSpPr>
             <a:spLocks noGrp="1"/>
           </p:cNvSpPr>
@@ -473,7 +426,6 @@
           <a:p>
             <a:fld id="{51FD5836-1B78-4E70-983F-F8F353C30F27}" type="datetimeFigureOut">
               <a:rPr lang="zh-CN" altLang="en-US" smtClean="0"/>
-              <a:t>2024/5/23</a:t>
             </a:fld>
             <a:endParaRPr lang="zh-CN" altLang="en-US"/>
           </a:p>
@@ -481,13 +433,7 @@
       </p:sp>
       <p:sp>
         <p:nvSpPr>
-          <p:cNvPr id="5" name="页脚占位符 4">
-            <a:extLst>
-              <a:ext uri="{FF2B5EF4-FFF2-40B4-BE49-F238E27FC236}">
-                <a16:creationId xmlns:a16="http://schemas.microsoft.com/office/drawing/2014/main" id="{F154DD3F-33B4-2551-865E-EF1B375A6871}"/>
-              </a:ext>
-            </a:extLst>
-          </p:cNvPr>
+          <p:cNvPr id="5" name="页脚占位符 4"/>
           <p:cNvSpPr>
             <a:spLocks noGrp="1"/>
           </p:cNvSpPr>
@@ -506,13 +452,7 @@
       </p:sp>
       <p:sp>
         <p:nvSpPr>
-          <p:cNvPr id="6" name="灯片编号占位符 5">
-            <a:extLst>
-              <a:ext uri="{FF2B5EF4-FFF2-40B4-BE49-F238E27FC236}">
-                <a16:creationId xmlns:a16="http://schemas.microsoft.com/office/drawing/2014/main" id="{8826AE92-F3B5-21E8-2302-59A0B7F22727}"/>
-              </a:ext>
-            </a:extLst>
-          </p:cNvPr>
+          <p:cNvPr id="6" name="灯片编号占位符 5"/>
           <p:cNvSpPr>
             <a:spLocks noGrp="1"/>
           </p:cNvSpPr>
@@ -527,18 +467,12 @@
           <a:p>
             <a:fld id="{AB80B9A9-C03D-4F64-ADE2-7C0EC2978D5F}" type="slidenum">
               <a:rPr lang="zh-CN" altLang="en-US" smtClean="0"/>
-              <a:t>‹#›</a:t>
             </a:fld>
             <a:endParaRPr lang="zh-CN" altLang="en-US"/>
           </a:p>
         </p:txBody>
       </p:sp>
     </p:spTree>
-    <p:extLst>
-      <p:ext uri="{BB962C8B-B14F-4D97-AF65-F5344CB8AC3E}">
-        <p14:creationId xmlns:p14="http://schemas.microsoft.com/office/powerpoint/2010/main" val="3643883580"/>
-      </p:ext>
-    </p:extLst>
   </p:cSld>
   <p:clrMapOvr>
     <a:masterClrMapping/>
@@ -565,13 +499,7 @@
       </p:grpSpPr>
       <p:sp>
         <p:nvSpPr>
-          <p:cNvPr id="2" name="竖排标题 1">
-            <a:extLst>
-              <a:ext uri="{FF2B5EF4-FFF2-40B4-BE49-F238E27FC236}">
-                <a16:creationId xmlns:a16="http://schemas.microsoft.com/office/drawing/2014/main" id="{AD0698DA-4B0B-A514-5867-F8E8CB040812}"/>
-              </a:ext>
-            </a:extLst>
-          </p:cNvPr>
+          <p:cNvPr id="2" name="竖排标题 1"/>
           <p:cNvSpPr>
             <a:spLocks noGrp="1"/>
           </p:cNvSpPr>
@@ -593,18 +521,13 @@
               <a:rPr lang="zh-CN" altLang="en-US"/>
               <a:t>单击此处编辑母版标题样式</a:t>
             </a:r>
-          </a:p>
-        </p:txBody>
-      </p:sp>
-      <p:sp>
-        <p:nvSpPr>
-          <p:cNvPr id="3" name="竖排文字占位符 2">
-            <a:extLst>
-              <a:ext uri="{FF2B5EF4-FFF2-40B4-BE49-F238E27FC236}">
-                <a16:creationId xmlns:a16="http://schemas.microsoft.com/office/drawing/2014/main" id="{A02F958C-6D22-32A9-9F62-A8FD3D4B723E}"/>
-              </a:ext>
-            </a:extLst>
-          </p:cNvPr>
+            <a:endParaRPr lang="zh-CN" altLang="en-US"/>
+          </a:p>
+        </p:txBody>
+      </p:sp>
+      <p:sp>
+        <p:nvSpPr>
+          <p:cNvPr id="3" name="竖排文字占位符 2"/>
           <p:cNvSpPr>
             <a:spLocks noGrp="1"/>
           </p:cNvSpPr>
@@ -627,6 +550,7 @@
               <a:rPr lang="zh-CN" altLang="en-US"/>
               <a:t>单击此处编辑母版文本样式</a:t>
             </a:r>
+            <a:endParaRPr lang="zh-CN" altLang="en-US"/>
           </a:p>
           <a:p>
             <a:pPr lvl="1"/>
@@ -634,6 +558,7 @@
               <a:rPr lang="zh-CN" altLang="en-US"/>
               <a:t>二级</a:t>
             </a:r>
+            <a:endParaRPr lang="zh-CN" altLang="en-US"/>
           </a:p>
           <a:p>
             <a:pPr lvl="2"/>
@@ -641,6 +566,7 @@
               <a:rPr lang="zh-CN" altLang="en-US"/>
               <a:t>三级</a:t>
             </a:r>
+            <a:endParaRPr lang="zh-CN" altLang="en-US"/>
           </a:p>
           <a:p>
             <a:pPr lvl="3"/>
@@ -648,6 +574,7 @@
               <a:rPr lang="zh-CN" altLang="en-US"/>
               <a:t>四级</a:t>
             </a:r>
+            <a:endParaRPr lang="zh-CN" altLang="en-US"/>
           </a:p>
           <a:p>
             <a:pPr lvl="4"/>
@@ -655,18 +582,13 @@
               <a:rPr lang="zh-CN" altLang="en-US"/>
               <a:t>五级</a:t>
             </a:r>
-          </a:p>
-        </p:txBody>
-      </p:sp>
-      <p:sp>
-        <p:nvSpPr>
-          <p:cNvPr id="4" name="日期占位符 3">
-            <a:extLst>
-              <a:ext uri="{FF2B5EF4-FFF2-40B4-BE49-F238E27FC236}">
-                <a16:creationId xmlns:a16="http://schemas.microsoft.com/office/drawing/2014/main" id="{7EAB5047-F052-894F-3FB2-905E25E7CBE9}"/>
-              </a:ext>
-            </a:extLst>
-          </p:cNvPr>
+            <a:endParaRPr lang="zh-CN" altLang="en-US"/>
+          </a:p>
+        </p:txBody>
+      </p:sp>
+      <p:sp>
+        <p:nvSpPr>
+          <p:cNvPr id="4" name="日期占位符 3"/>
           <p:cNvSpPr>
             <a:spLocks noGrp="1"/>
           </p:cNvSpPr>
@@ -681,7 +603,6 @@
           <a:p>
             <a:fld id="{51FD5836-1B78-4E70-983F-F8F353C30F27}" type="datetimeFigureOut">
               <a:rPr lang="zh-CN" altLang="en-US" smtClean="0"/>
-              <a:t>2024/5/23</a:t>
             </a:fld>
             <a:endParaRPr lang="zh-CN" altLang="en-US"/>
           </a:p>
@@ -689,13 +610,7 @@
       </p:sp>
       <p:sp>
         <p:nvSpPr>
-          <p:cNvPr id="5" name="页脚占位符 4">
-            <a:extLst>
-              <a:ext uri="{FF2B5EF4-FFF2-40B4-BE49-F238E27FC236}">
-                <a16:creationId xmlns:a16="http://schemas.microsoft.com/office/drawing/2014/main" id="{21987688-C609-D828-EA35-1C9F3811EE11}"/>
-              </a:ext>
-            </a:extLst>
-          </p:cNvPr>
+          <p:cNvPr id="5" name="页脚占位符 4"/>
           <p:cNvSpPr>
             <a:spLocks noGrp="1"/>
           </p:cNvSpPr>
@@ -714,13 +629,7 @@
       </p:sp>
       <p:sp>
         <p:nvSpPr>
-          <p:cNvPr id="6" name="灯片编号占位符 5">
-            <a:extLst>
-              <a:ext uri="{FF2B5EF4-FFF2-40B4-BE49-F238E27FC236}">
-                <a16:creationId xmlns:a16="http://schemas.microsoft.com/office/drawing/2014/main" id="{19BDF728-4570-D753-36AD-6658FC58571D}"/>
-              </a:ext>
-            </a:extLst>
-          </p:cNvPr>
+          <p:cNvPr id="6" name="灯片编号占位符 5"/>
           <p:cNvSpPr>
             <a:spLocks noGrp="1"/>
           </p:cNvSpPr>
@@ -735,18 +644,12 @@
           <a:p>
             <a:fld id="{AB80B9A9-C03D-4F64-ADE2-7C0EC2978D5F}" type="slidenum">
               <a:rPr lang="zh-CN" altLang="en-US" smtClean="0"/>
-              <a:t>‹#›</a:t>
             </a:fld>
             <a:endParaRPr lang="zh-CN" altLang="en-US"/>
           </a:p>
         </p:txBody>
       </p:sp>
     </p:spTree>
-    <p:extLst>
-      <p:ext uri="{BB962C8B-B14F-4D97-AF65-F5344CB8AC3E}">
-        <p14:creationId xmlns:p14="http://schemas.microsoft.com/office/powerpoint/2010/main" val="1081376952"/>
-      </p:ext>
-    </p:extLst>
   </p:cSld>
   <p:clrMapOvr>
     <a:masterClrMapping/>
@@ -773,13 +676,7 @@
       </p:grpSpPr>
       <p:sp>
         <p:nvSpPr>
-          <p:cNvPr id="2" name="标题 1">
-            <a:extLst>
-              <a:ext uri="{FF2B5EF4-FFF2-40B4-BE49-F238E27FC236}">
-                <a16:creationId xmlns:a16="http://schemas.microsoft.com/office/drawing/2014/main" id="{6F6EBC0D-1B88-607E-C7C4-2EACCD207F7A}"/>
-              </a:ext>
-            </a:extLst>
-          </p:cNvPr>
+          <p:cNvPr id="2" name="标题 1"/>
           <p:cNvSpPr>
             <a:spLocks noGrp="1"/>
           </p:cNvSpPr>
@@ -796,18 +693,13 @@
               <a:rPr lang="zh-CN" altLang="en-US"/>
               <a:t>单击此处编辑母版标题样式</a:t>
             </a:r>
-          </a:p>
-        </p:txBody>
-      </p:sp>
-      <p:sp>
-        <p:nvSpPr>
-          <p:cNvPr id="3" name="内容占位符 2">
-            <a:extLst>
-              <a:ext uri="{FF2B5EF4-FFF2-40B4-BE49-F238E27FC236}">
-                <a16:creationId xmlns:a16="http://schemas.microsoft.com/office/drawing/2014/main" id="{4C7B4188-7DE6-1CAF-5A43-177C40324AA4}"/>
-              </a:ext>
-            </a:extLst>
-          </p:cNvPr>
+            <a:endParaRPr lang="zh-CN" altLang="en-US"/>
+          </a:p>
+        </p:txBody>
+      </p:sp>
+      <p:sp>
+        <p:nvSpPr>
+          <p:cNvPr id="3" name="内容占位符 2"/>
           <p:cNvSpPr>
             <a:spLocks noGrp="1"/>
           </p:cNvSpPr>
@@ -825,6 +717,7 @@
               <a:rPr lang="zh-CN" altLang="en-US"/>
               <a:t>单击此处编辑母版文本样式</a:t>
             </a:r>
+            <a:endParaRPr lang="zh-CN" altLang="en-US"/>
           </a:p>
           <a:p>
             <a:pPr lvl="1"/>
@@ -832,6 +725,7 @@
               <a:rPr lang="zh-CN" altLang="en-US"/>
               <a:t>二级</a:t>
             </a:r>
+            <a:endParaRPr lang="zh-CN" altLang="en-US"/>
           </a:p>
           <a:p>
             <a:pPr lvl="2"/>
@@ -839,6 +733,7 @@
               <a:rPr lang="zh-CN" altLang="en-US"/>
               <a:t>三级</a:t>
             </a:r>
+            <a:endParaRPr lang="zh-CN" altLang="en-US"/>
           </a:p>
           <a:p>
             <a:pPr lvl="3"/>
@@ -846,6 +741,7 @@
               <a:rPr lang="zh-CN" altLang="en-US"/>
               <a:t>四级</a:t>
             </a:r>
+            <a:endParaRPr lang="zh-CN" altLang="en-US"/>
           </a:p>
           <a:p>
             <a:pPr lvl="4"/>
@@ -853,18 +749,13 @@
               <a:rPr lang="zh-CN" altLang="en-US"/>
               <a:t>五级</a:t>
             </a:r>
-          </a:p>
-        </p:txBody>
-      </p:sp>
-      <p:sp>
-        <p:nvSpPr>
-          <p:cNvPr id="4" name="日期占位符 3">
-            <a:extLst>
-              <a:ext uri="{FF2B5EF4-FFF2-40B4-BE49-F238E27FC236}">
-                <a16:creationId xmlns:a16="http://schemas.microsoft.com/office/drawing/2014/main" id="{F1BA012D-CA9B-7428-9CAA-3638722AB9E7}"/>
-              </a:ext>
-            </a:extLst>
-          </p:cNvPr>
+            <a:endParaRPr lang="zh-CN" altLang="en-US"/>
+          </a:p>
+        </p:txBody>
+      </p:sp>
+      <p:sp>
+        <p:nvSpPr>
+          <p:cNvPr id="4" name="日期占位符 3"/>
           <p:cNvSpPr>
             <a:spLocks noGrp="1"/>
           </p:cNvSpPr>
@@ -879,7 +770,6 @@
           <a:p>
             <a:fld id="{51FD5836-1B78-4E70-983F-F8F353C30F27}" type="datetimeFigureOut">
               <a:rPr lang="zh-CN" altLang="en-US" smtClean="0"/>
-              <a:t>2024/5/23</a:t>
             </a:fld>
             <a:endParaRPr lang="zh-CN" altLang="en-US"/>
           </a:p>
@@ -887,13 +777,7 @@
       </p:sp>
       <p:sp>
         <p:nvSpPr>
-          <p:cNvPr id="5" name="页脚占位符 4">
-            <a:extLst>
-              <a:ext uri="{FF2B5EF4-FFF2-40B4-BE49-F238E27FC236}">
-                <a16:creationId xmlns:a16="http://schemas.microsoft.com/office/drawing/2014/main" id="{E9F44021-10A5-055C-15AD-14BA87D310C4}"/>
-              </a:ext>
-            </a:extLst>
-          </p:cNvPr>
+          <p:cNvPr id="5" name="页脚占位符 4"/>
           <p:cNvSpPr>
             <a:spLocks noGrp="1"/>
           </p:cNvSpPr>
@@ -912,13 +796,7 @@
       </p:sp>
       <p:sp>
         <p:nvSpPr>
-          <p:cNvPr id="6" name="灯片编号占位符 5">
-            <a:extLst>
-              <a:ext uri="{FF2B5EF4-FFF2-40B4-BE49-F238E27FC236}">
-                <a16:creationId xmlns:a16="http://schemas.microsoft.com/office/drawing/2014/main" id="{37584ED8-8563-3409-0E9D-D7DD1D4F7EB4}"/>
-              </a:ext>
-            </a:extLst>
-          </p:cNvPr>
+          <p:cNvPr id="6" name="灯片编号占位符 5"/>
           <p:cNvSpPr>
             <a:spLocks noGrp="1"/>
           </p:cNvSpPr>
@@ -933,18 +811,12 @@
           <a:p>
             <a:fld id="{AB80B9A9-C03D-4F64-ADE2-7C0EC2978D5F}" type="slidenum">
               <a:rPr lang="zh-CN" altLang="en-US" smtClean="0"/>
-              <a:t>‹#›</a:t>
             </a:fld>
             <a:endParaRPr lang="zh-CN" altLang="en-US"/>
           </a:p>
         </p:txBody>
       </p:sp>
     </p:spTree>
-    <p:extLst>
-      <p:ext uri="{BB962C8B-B14F-4D97-AF65-F5344CB8AC3E}">
-        <p14:creationId xmlns:p14="http://schemas.microsoft.com/office/powerpoint/2010/main" val="991973923"/>
-      </p:ext>
-    </p:extLst>
   </p:cSld>
   <p:clrMapOvr>
     <a:masterClrMapping/>
@@ -971,13 +843,7 @@
       </p:grpSpPr>
       <p:sp>
         <p:nvSpPr>
-          <p:cNvPr id="2" name="标题 1">
-            <a:extLst>
-              <a:ext uri="{FF2B5EF4-FFF2-40B4-BE49-F238E27FC236}">
-                <a16:creationId xmlns:a16="http://schemas.microsoft.com/office/drawing/2014/main" id="{5D1536B6-A158-9E03-649B-68CF26A2ABEB}"/>
-              </a:ext>
-            </a:extLst>
-          </p:cNvPr>
+          <p:cNvPr id="2" name="标题 1"/>
           <p:cNvSpPr>
             <a:spLocks noGrp="1"/>
           </p:cNvSpPr>
@@ -1003,18 +869,13 @@
               <a:rPr lang="zh-CN" altLang="en-US"/>
               <a:t>单击此处编辑母版标题样式</a:t>
             </a:r>
-          </a:p>
-        </p:txBody>
-      </p:sp>
-      <p:sp>
-        <p:nvSpPr>
-          <p:cNvPr id="3" name="文本占位符 2">
-            <a:extLst>
-              <a:ext uri="{FF2B5EF4-FFF2-40B4-BE49-F238E27FC236}">
-                <a16:creationId xmlns:a16="http://schemas.microsoft.com/office/drawing/2014/main" id="{2903240D-2D56-ECF8-B447-3DD14A9A96DF}"/>
-              </a:ext>
-            </a:extLst>
-          </p:cNvPr>
+            <a:endParaRPr lang="zh-CN" altLang="en-US"/>
+          </a:p>
+        </p:txBody>
+      </p:sp>
+      <p:sp>
+        <p:nvSpPr>
+          <p:cNvPr id="3" name="文本占位符 2"/>
           <p:cNvSpPr>
             <a:spLocks noGrp="1"/>
           </p:cNvSpPr>
@@ -1128,18 +989,13 @@
               <a:rPr lang="zh-CN" altLang="en-US"/>
               <a:t>单击此处编辑母版文本样式</a:t>
             </a:r>
-          </a:p>
-        </p:txBody>
-      </p:sp>
-      <p:sp>
-        <p:nvSpPr>
-          <p:cNvPr id="4" name="日期占位符 3">
-            <a:extLst>
-              <a:ext uri="{FF2B5EF4-FFF2-40B4-BE49-F238E27FC236}">
-                <a16:creationId xmlns:a16="http://schemas.microsoft.com/office/drawing/2014/main" id="{9F277EC6-BEA0-262E-DDE9-2E1755317F36}"/>
-              </a:ext>
-            </a:extLst>
-          </p:cNvPr>
+            <a:endParaRPr lang="zh-CN" altLang="en-US"/>
+          </a:p>
+        </p:txBody>
+      </p:sp>
+      <p:sp>
+        <p:nvSpPr>
+          <p:cNvPr id="4" name="日期占位符 3"/>
           <p:cNvSpPr>
             <a:spLocks noGrp="1"/>
           </p:cNvSpPr>
@@ -1154,7 +1010,6 @@
           <a:p>
             <a:fld id="{51FD5836-1B78-4E70-983F-F8F353C30F27}" type="datetimeFigureOut">
               <a:rPr lang="zh-CN" altLang="en-US" smtClean="0"/>
-              <a:t>2024/5/23</a:t>
             </a:fld>
             <a:endParaRPr lang="zh-CN" altLang="en-US"/>
           </a:p>
@@ -1162,13 +1017,7 @@
       </p:sp>
       <p:sp>
         <p:nvSpPr>
-          <p:cNvPr id="5" name="页脚占位符 4">
-            <a:extLst>
-              <a:ext uri="{FF2B5EF4-FFF2-40B4-BE49-F238E27FC236}">
-                <a16:creationId xmlns:a16="http://schemas.microsoft.com/office/drawing/2014/main" id="{DF3A587D-3B7D-226D-C5E9-3B6C62AA634C}"/>
-              </a:ext>
-            </a:extLst>
-          </p:cNvPr>
+          <p:cNvPr id="5" name="页脚占位符 4"/>
           <p:cNvSpPr>
             <a:spLocks noGrp="1"/>
           </p:cNvSpPr>
@@ -1187,13 +1036,7 @@
       </p:sp>
       <p:sp>
         <p:nvSpPr>
-          <p:cNvPr id="6" name="灯片编号占位符 5">
-            <a:extLst>
-              <a:ext uri="{FF2B5EF4-FFF2-40B4-BE49-F238E27FC236}">
-                <a16:creationId xmlns:a16="http://schemas.microsoft.com/office/drawing/2014/main" id="{FA89B29B-C5A4-C860-C234-0CE348BCCF76}"/>
-              </a:ext>
-            </a:extLst>
-          </p:cNvPr>
+          <p:cNvPr id="6" name="灯片编号占位符 5"/>
           <p:cNvSpPr>
             <a:spLocks noGrp="1"/>
           </p:cNvSpPr>
@@ -1208,18 +1051,12 @@
           <a:p>
             <a:fld id="{AB80B9A9-C03D-4F64-ADE2-7C0EC2978D5F}" type="slidenum">
               <a:rPr lang="zh-CN" altLang="en-US" smtClean="0"/>
-              <a:t>‹#›</a:t>
             </a:fld>
             <a:endParaRPr lang="zh-CN" altLang="en-US"/>
           </a:p>
         </p:txBody>
       </p:sp>
     </p:spTree>
-    <p:extLst>
-      <p:ext uri="{BB962C8B-B14F-4D97-AF65-F5344CB8AC3E}">
-        <p14:creationId xmlns:p14="http://schemas.microsoft.com/office/powerpoint/2010/main" val="2587493267"/>
-      </p:ext>
-    </p:extLst>
   </p:cSld>
   <p:clrMapOvr>
     <a:masterClrMapping/>
@@ -1246,13 +1083,7 @@
       </p:grpSpPr>
       <p:sp>
         <p:nvSpPr>
-          <p:cNvPr id="2" name="标题 1">
-            <a:extLst>
-              <a:ext uri="{FF2B5EF4-FFF2-40B4-BE49-F238E27FC236}">
-                <a16:creationId xmlns:a16="http://schemas.microsoft.com/office/drawing/2014/main" id="{F82FECBF-C234-D9AB-CB59-9DEA67791274}"/>
-              </a:ext>
-            </a:extLst>
-          </p:cNvPr>
+          <p:cNvPr id="2" name="标题 1"/>
           <p:cNvSpPr>
             <a:spLocks noGrp="1"/>
           </p:cNvSpPr>
@@ -1269,18 +1100,13 @@
               <a:rPr lang="zh-CN" altLang="en-US"/>
               <a:t>单击此处编辑母版标题样式</a:t>
             </a:r>
-          </a:p>
-        </p:txBody>
-      </p:sp>
-      <p:sp>
-        <p:nvSpPr>
-          <p:cNvPr id="3" name="内容占位符 2">
-            <a:extLst>
-              <a:ext uri="{FF2B5EF4-FFF2-40B4-BE49-F238E27FC236}">
-                <a16:creationId xmlns:a16="http://schemas.microsoft.com/office/drawing/2014/main" id="{CB153575-3876-C7F1-E486-740AAD62E7C7}"/>
-              </a:ext>
-            </a:extLst>
-          </p:cNvPr>
+            <a:endParaRPr lang="zh-CN" altLang="en-US"/>
+          </a:p>
+        </p:txBody>
+      </p:sp>
+      <p:sp>
+        <p:nvSpPr>
+          <p:cNvPr id="3" name="内容占位符 2"/>
           <p:cNvSpPr>
             <a:spLocks noGrp="1"/>
           </p:cNvSpPr>
@@ -1303,6 +1129,7 @@
               <a:rPr lang="zh-CN" altLang="en-US"/>
               <a:t>单击此处编辑母版文本样式</a:t>
             </a:r>
+            <a:endParaRPr lang="zh-CN" altLang="en-US"/>
           </a:p>
           <a:p>
             <a:pPr lvl="1"/>
@@ -1310,6 +1137,7 @@
               <a:rPr lang="zh-CN" altLang="en-US"/>
               <a:t>二级</a:t>
             </a:r>
+            <a:endParaRPr lang="zh-CN" altLang="en-US"/>
           </a:p>
           <a:p>
             <a:pPr lvl="2"/>
@@ -1317,6 +1145,7 @@
               <a:rPr lang="zh-CN" altLang="en-US"/>
               <a:t>三级</a:t>
             </a:r>
+            <a:endParaRPr lang="zh-CN" altLang="en-US"/>
           </a:p>
           <a:p>
             <a:pPr lvl="3"/>
@@ -1324,6 +1153,7 @@
               <a:rPr lang="zh-CN" altLang="en-US"/>
               <a:t>四级</a:t>
             </a:r>
+            <a:endParaRPr lang="zh-CN" altLang="en-US"/>
           </a:p>
           <a:p>
             <a:pPr lvl="4"/>
@@ -1331,18 +1161,13 @@
               <a:rPr lang="zh-CN" altLang="en-US"/>
               <a:t>五级</a:t>
             </a:r>
-          </a:p>
-        </p:txBody>
-      </p:sp>
-      <p:sp>
-        <p:nvSpPr>
-          <p:cNvPr id="4" name="内容占位符 3">
-            <a:extLst>
-              <a:ext uri="{FF2B5EF4-FFF2-40B4-BE49-F238E27FC236}">
-                <a16:creationId xmlns:a16="http://schemas.microsoft.com/office/drawing/2014/main" id="{81E6925A-2F32-C9BF-7328-169DB984634F}"/>
-              </a:ext>
-            </a:extLst>
-          </p:cNvPr>
+            <a:endParaRPr lang="zh-CN" altLang="en-US"/>
+          </a:p>
+        </p:txBody>
+      </p:sp>
+      <p:sp>
+        <p:nvSpPr>
+          <p:cNvPr id="4" name="内容占位符 3"/>
           <p:cNvSpPr>
             <a:spLocks noGrp="1"/>
           </p:cNvSpPr>
@@ -1365,6 +1190,7 @@
               <a:rPr lang="zh-CN" altLang="en-US"/>
               <a:t>单击此处编辑母版文本样式</a:t>
             </a:r>
+            <a:endParaRPr lang="zh-CN" altLang="en-US"/>
           </a:p>
           <a:p>
             <a:pPr lvl="1"/>
@@ -1372,6 +1198,7 @@
               <a:rPr lang="zh-CN" altLang="en-US"/>
               <a:t>二级</a:t>
             </a:r>
+            <a:endParaRPr lang="zh-CN" altLang="en-US"/>
           </a:p>
           <a:p>
             <a:pPr lvl="2"/>
@@ -1379,6 +1206,7 @@
               <a:rPr lang="zh-CN" altLang="en-US"/>
               <a:t>三级</a:t>
             </a:r>
+            <a:endParaRPr lang="zh-CN" altLang="en-US"/>
           </a:p>
           <a:p>
             <a:pPr lvl="3"/>
@@ -1386,6 +1214,7 @@
               <a:rPr lang="zh-CN" altLang="en-US"/>
               <a:t>四级</a:t>
             </a:r>
+            <a:endParaRPr lang="zh-CN" altLang="en-US"/>
           </a:p>
           <a:p>
             <a:pPr lvl="4"/>
@@ -1393,18 +1222,13 @@
               <a:rPr lang="zh-CN" altLang="en-US"/>
               <a:t>五级</a:t>
             </a:r>
-          </a:p>
-        </p:txBody>
-      </p:sp>
-      <p:sp>
-        <p:nvSpPr>
-          <p:cNvPr id="5" name="日期占位符 4">
-            <a:extLst>
-              <a:ext uri="{FF2B5EF4-FFF2-40B4-BE49-F238E27FC236}">
-                <a16:creationId xmlns:a16="http://schemas.microsoft.com/office/drawing/2014/main" id="{29AC4A85-6DD0-A57A-F878-8A0B18D7E4A2}"/>
-              </a:ext>
-            </a:extLst>
-          </p:cNvPr>
+            <a:endParaRPr lang="zh-CN" altLang="en-US"/>
+          </a:p>
+        </p:txBody>
+      </p:sp>
+      <p:sp>
+        <p:nvSpPr>
+          <p:cNvPr id="5" name="日期占位符 4"/>
           <p:cNvSpPr>
             <a:spLocks noGrp="1"/>
           </p:cNvSpPr>
@@ -1419,7 +1243,6 @@
           <a:p>
             <a:fld id="{51FD5836-1B78-4E70-983F-F8F353C30F27}" type="datetimeFigureOut">
               <a:rPr lang="zh-CN" altLang="en-US" smtClean="0"/>
-              <a:t>2024/5/23</a:t>
             </a:fld>
             <a:endParaRPr lang="zh-CN" altLang="en-US"/>
           </a:p>
@@ -1427,13 +1250,7 @@
       </p:sp>
       <p:sp>
         <p:nvSpPr>
-          <p:cNvPr id="6" name="页脚占位符 5">
-            <a:extLst>
-              <a:ext uri="{FF2B5EF4-FFF2-40B4-BE49-F238E27FC236}">
-                <a16:creationId xmlns:a16="http://schemas.microsoft.com/office/drawing/2014/main" id="{93CC4FC1-5C31-B182-F86F-3045D11997AA}"/>
-              </a:ext>
-            </a:extLst>
-          </p:cNvPr>
+          <p:cNvPr id="6" name="页脚占位符 5"/>
           <p:cNvSpPr>
             <a:spLocks noGrp="1"/>
           </p:cNvSpPr>
@@ -1452,13 +1269,7 @@
       </p:sp>
       <p:sp>
         <p:nvSpPr>
-          <p:cNvPr id="7" name="灯片编号占位符 6">
-            <a:extLst>
-              <a:ext uri="{FF2B5EF4-FFF2-40B4-BE49-F238E27FC236}">
-                <a16:creationId xmlns:a16="http://schemas.microsoft.com/office/drawing/2014/main" id="{D1DCD7CD-6091-CF3E-2D5C-B5794DE5798A}"/>
-              </a:ext>
-            </a:extLst>
-          </p:cNvPr>
+          <p:cNvPr id="7" name="灯片编号占位符 6"/>
           <p:cNvSpPr>
             <a:spLocks noGrp="1"/>
           </p:cNvSpPr>
@@ -1473,18 +1284,12 @@
           <a:p>
             <a:fld id="{AB80B9A9-C03D-4F64-ADE2-7C0EC2978D5F}" type="slidenum">
               <a:rPr lang="zh-CN" altLang="en-US" smtClean="0"/>
-              <a:t>‹#›</a:t>
             </a:fld>
             <a:endParaRPr lang="zh-CN" altLang="en-US"/>
           </a:p>
         </p:txBody>
       </p:sp>
     </p:spTree>
-    <p:extLst>
-      <p:ext uri="{BB962C8B-B14F-4D97-AF65-F5344CB8AC3E}">
-        <p14:creationId xmlns:p14="http://schemas.microsoft.com/office/powerpoint/2010/main" val="3719311158"/>
-      </p:ext>
-    </p:extLst>
   </p:cSld>
   <p:clrMapOvr>
     <a:masterClrMapping/>
@@ -1511,13 +1316,7 @@
       </p:grpSpPr>
       <p:sp>
         <p:nvSpPr>
-          <p:cNvPr id="2" name="标题 1">
-            <a:extLst>
-              <a:ext uri="{FF2B5EF4-FFF2-40B4-BE49-F238E27FC236}">
-                <a16:creationId xmlns:a16="http://schemas.microsoft.com/office/drawing/2014/main" id="{D884B835-2793-0A9C-1645-97FB53A09FEE}"/>
-              </a:ext>
-            </a:extLst>
-          </p:cNvPr>
+          <p:cNvPr id="2" name="标题 1"/>
           <p:cNvSpPr>
             <a:spLocks noGrp="1"/>
           </p:cNvSpPr>
@@ -1539,18 +1338,13 @@
               <a:rPr lang="zh-CN" altLang="en-US"/>
               <a:t>单击此处编辑母版标题样式</a:t>
             </a:r>
-          </a:p>
-        </p:txBody>
-      </p:sp>
-      <p:sp>
-        <p:nvSpPr>
-          <p:cNvPr id="3" name="文本占位符 2">
-            <a:extLst>
-              <a:ext uri="{FF2B5EF4-FFF2-40B4-BE49-F238E27FC236}">
-                <a16:creationId xmlns:a16="http://schemas.microsoft.com/office/drawing/2014/main" id="{45B49C1B-D4A1-4F32-34D0-0E87A4AD6453}"/>
-              </a:ext>
-            </a:extLst>
-          </p:cNvPr>
+            <a:endParaRPr lang="zh-CN" altLang="en-US"/>
+          </a:p>
+        </p:txBody>
+      </p:sp>
+      <p:sp>
+        <p:nvSpPr>
+          <p:cNvPr id="3" name="文本占位符 2"/>
           <p:cNvSpPr>
             <a:spLocks noGrp="1"/>
           </p:cNvSpPr>
@@ -1610,18 +1404,13 @@
               <a:rPr lang="zh-CN" altLang="en-US"/>
               <a:t>单击此处编辑母版文本样式</a:t>
             </a:r>
-          </a:p>
-        </p:txBody>
-      </p:sp>
-      <p:sp>
-        <p:nvSpPr>
-          <p:cNvPr id="4" name="内容占位符 3">
-            <a:extLst>
-              <a:ext uri="{FF2B5EF4-FFF2-40B4-BE49-F238E27FC236}">
-                <a16:creationId xmlns:a16="http://schemas.microsoft.com/office/drawing/2014/main" id="{F3B06966-9630-CB20-F84D-4DC0A25FFF85}"/>
-              </a:ext>
-            </a:extLst>
-          </p:cNvPr>
+            <a:endParaRPr lang="zh-CN" altLang="en-US"/>
+          </a:p>
+        </p:txBody>
+      </p:sp>
+      <p:sp>
+        <p:nvSpPr>
+          <p:cNvPr id="4" name="内容占位符 3"/>
           <p:cNvSpPr>
             <a:spLocks noGrp="1"/>
           </p:cNvSpPr>
@@ -1644,6 +1433,7 @@
               <a:rPr lang="zh-CN" altLang="en-US"/>
               <a:t>单击此处编辑母版文本样式</a:t>
             </a:r>
+            <a:endParaRPr lang="zh-CN" altLang="en-US"/>
           </a:p>
           <a:p>
             <a:pPr lvl="1"/>
@@ -1651,6 +1441,7 @@
               <a:rPr lang="zh-CN" altLang="en-US"/>
               <a:t>二级</a:t>
             </a:r>
+            <a:endParaRPr lang="zh-CN" altLang="en-US"/>
           </a:p>
           <a:p>
             <a:pPr lvl="2"/>
@@ -1658,6 +1449,7 @@
               <a:rPr lang="zh-CN" altLang="en-US"/>
               <a:t>三级</a:t>
             </a:r>
+            <a:endParaRPr lang="zh-CN" altLang="en-US"/>
           </a:p>
           <a:p>
             <a:pPr lvl="3"/>
@@ -1665,6 +1457,7 @@
               <a:rPr lang="zh-CN" altLang="en-US"/>
               <a:t>四级</a:t>
             </a:r>
+            <a:endParaRPr lang="zh-CN" altLang="en-US"/>
           </a:p>
           <a:p>
             <a:pPr lvl="4"/>
@@ -1672,18 +1465,13 @@
               <a:rPr lang="zh-CN" altLang="en-US"/>
               <a:t>五级</a:t>
             </a:r>
-          </a:p>
-        </p:txBody>
-      </p:sp>
-      <p:sp>
-        <p:nvSpPr>
-          <p:cNvPr id="5" name="文本占位符 4">
-            <a:extLst>
-              <a:ext uri="{FF2B5EF4-FFF2-40B4-BE49-F238E27FC236}">
-                <a16:creationId xmlns:a16="http://schemas.microsoft.com/office/drawing/2014/main" id="{89EFB63C-45D3-5CAF-DD78-2713BDBF6E15}"/>
-              </a:ext>
-            </a:extLst>
-          </p:cNvPr>
+            <a:endParaRPr lang="zh-CN" altLang="en-US"/>
+          </a:p>
+        </p:txBody>
+      </p:sp>
+      <p:sp>
+        <p:nvSpPr>
+          <p:cNvPr id="5" name="文本占位符 4"/>
           <p:cNvSpPr>
             <a:spLocks noGrp="1"/>
           </p:cNvSpPr>
@@ -1743,18 +1531,13 @@
               <a:rPr lang="zh-CN" altLang="en-US"/>
               <a:t>单击此处编辑母版文本样式</a:t>
             </a:r>
-          </a:p>
-        </p:txBody>
-      </p:sp>
-      <p:sp>
-        <p:nvSpPr>
-          <p:cNvPr id="6" name="内容占位符 5">
-            <a:extLst>
-              <a:ext uri="{FF2B5EF4-FFF2-40B4-BE49-F238E27FC236}">
-                <a16:creationId xmlns:a16="http://schemas.microsoft.com/office/drawing/2014/main" id="{E40F69A7-89DA-7371-2929-A86EA71F625B}"/>
-              </a:ext>
-            </a:extLst>
-          </p:cNvPr>
+            <a:endParaRPr lang="zh-CN" altLang="en-US"/>
+          </a:p>
+        </p:txBody>
+      </p:sp>
+      <p:sp>
+        <p:nvSpPr>
+          <p:cNvPr id="6" name="内容占位符 5"/>
           <p:cNvSpPr>
             <a:spLocks noGrp="1"/>
           </p:cNvSpPr>
@@ -1777,6 +1560,7 @@
               <a:rPr lang="zh-CN" altLang="en-US"/>
               <a:t>单击此处编辑母版文本样式</a:t>
             </a:r>
+            <a:endParaRPr lang="zh-CN" altLang="en-US"/>
           </a:p>
           <a:p>
             <a:pPr lvl="1"/>
@@ -1784,6 +1568,7 @@
               <a:rPr lang="zh-CN" altLang="en-US"/>
               <a:t>二级</a:t>
             </a:r>
+            <a:endParaRPr lang="zh-CN" altLang="en-US"/>
           </a:p>
           <a:p>
             <a:pPr lvl="2"/>
@@ -1791,6 +1576,7 @@
               <a:rPr lang="zh-CN" altLang="en-US"/>
               <a:t>三级</a:t>
             </a:r>
+            <a:endParaRPr lang="zh-CN" altLang="en-US"/>
           </a:p>
           <a:p>
             <a:pPr lvl="3"/>
@@ -1798,6 +1584,7 @@
               <a:rPr lang="zh-CN" altLang="en-US"/>
               <a:t>四级</a:t>
             </a:r>
+            <a:endParaRPr lang="zh-CN" altLang="en-US"/>
           </a:p>
           <a:p>
             <a:pPr lvl="4"/>
@@ -1805,18 +1592,13 @@
               <a:rPr lang="zh-CN" altLang="en-US"/>
               <a:t>五级</a:t>
             </a:r>
-          </a:p>
-        </p:txBody>
-      </p:sp>
-      <p:sp>
-        <p:nvSpPr>
-          <p:cNvPr id="7" name="日期占位符 6">
-            <a:extLst>
-              <a:ext uri="{FF2B5EF4-FFF2-40B4-BE49-F238E27FC236}">
-                <a16:creationId xmlns:a16="http://schemas.microsoft.com/office/drawing/2014/main" id="{85AA28C5-62D1-92A6-BA76-A587E511A9C0}"/>
-              </a:ext>
-            </a:extLst>
-          </p:cNvPr>
+            <a:endParaRPr lang="zh-CN" altLang="en-US"/>
+          </a:p>
+        </p:txBody>
+      </p:sp>
+      <p:sp>
+        <p:nvSpPr>
+          <p:cNvPr id="7" name="日期占位符 6"/>
           <p:cNvSpPr>
             <a:spLocks noGrp="1"/>
           </p:cNvSpPr>
@@ -1831,7 +1613,6 @@
           <a:p>
             <a:fld id="{51FD5836-1B78-4E70-983F-F8F353C30F27}" type="datetimeFigureOut">
               <a:rPr lang="zh-CN" altLang="en-US" smtClean="0"/>
-              <a:t>2024/5/23</a:t>
             </a:fld>
             <a:endParaRPr lang="zh-CN" altLang="en-US"/>
           </a:p>
@@ -1839,13 +1620,7 @@
       </p:sp>
       <p:sp>
         <p:nvSpPr>
-          <p:cNvPr id="8" name="页脚占位符 7">
-            <a:extLst>
-              <a:ext uri="{FF2B5EF4-FFF2-40B4-BE49-F238E27FC236}">
-                <a16:creationId xmlns:a16="http://schemas.microsoft.com/office/drawing/2014/main" id="{805973BB-8942-6678-E473-07B84461C787}"/>
-              </a:ext>
-            </a:extLst>
-          </p:cNvPr>
+          <p:cNvPr id="8" name="页脚占位符 7"/>
           <p:cNvSpPr>
             <a:spLocks noGrp="1"/>
           </p:cNvSpPr>
@@ -1864,13 +1639,7 @@
       </p:sp>
       <p:sp>
         <p:nvSpPr>
-          <p:cNvPr id="9" name="灯片编号占位符 8">
-            <a:extLst>
-              <a:ext uri="{FF2B5EF4-FFF2-40B4-BE49-F238E27FC236}">
-                <a16:creationId xmlns:a16="http://schemas.microsoft.com/office/drawing/2014/main" id="{85AF7BFC-BFF3-1EBF-9BA6-8A6FBBB65F2C}"/>
-              </a:ext>
-            </a:extLst>
-          </p:cNvPr>
+          <p:cNvPr id="9" name="灯片编号占位符 8"/>
           <p:cNvSpPr>
             <a:spLocks noGrp="1"/>
           </p:cNvSpPr>
@@ -1885,18 +1654,12 @@
           <a:p>
             <a:fld id="{AB80B9A9-C03D-4F64-ADE2-7C0EC2978D5F}" type="slidenum">
               <a:rPr lang="zh-CN" altLang="en-US" smtClean="0"/>
-              <a:t>‹#›</a:t>
             </a:fld>
             <a:endParaRPr lang="zh-CN" altLang="en-US"/>
           </a:p>
         </p:txBody>
       </p:sp>
     </p:spTree>
-    <p:extLst>
-      <p:ext uri="{BB962C8B-B14F-4D97-AF65-F5344CB8AC3E}">
-        <p14:creationId xmlns:p14="http://schemas.microsoft.com/office/powerpoint/2010/main" val="230755656"/>
-      </p:ext>
-    </p:extLst>
   </p:cSld>
   <p:clrMapOvr>
     <a:masterClrMapping/>
@@ -1923,13 +1686,7 @@
       </p:grpSpPr>
       <p:sp>
         <p:nvSpPr>
-          <p:cNvPr id="2" name="标题 1">
-            <a:extLst>
-              <a:ext uri="{FF2B5EF4-FFF2-40B4-BE49-F238E27FC236}">
-                <a16:creationId xmlns:a16="http://schemas.microsoft.com/office/drawing/2014/main" id="{9C539C49-444D-F633-6C51-4052E6EA52CD}"/>
-              </a:ext>
-            </a:extLst>
-          </p:cNvPr>
+          <p:cNvPr id="2" name="标题 1"/>
           <p:cNvSpPr>
             <a:spLocks noGrp="1"/>
           </p:cNvSpPr>
@@ -1946,18 +1703,13 @@
               <a:rPr lang="zh-CN" altLang="en-US"/>
               <a:t>单击此处编辑母版标题样式</a:t>
             </a:r>
-          </a:p>
-        </p:txBody>
-      </p:sp>
-      <p:sp>
-        <p:nvSpPr>
-          <p:cNvPr id="3" name="日期占位符 2">
-            <a:extLst>
-              <a:ext uri="{FF2B5EF4-FFF2-40B4-BE49-F238E27FC236}">
-                <a16:creationId xmlns:a16="http://schemas.microsoft.com/office/drawing/2014/main" id="{B3AB7732-D725-6FED-6266-2198AA05B4B6}"/>
-              </a:ext>
-            </a:extLst>
-          </p:cNvPr>
+            <a:endParaRPr lang="zh-CN" altLang="en-US"/>
+          </a:p>
+        </p:txBody>
+      </p:sp>
+      <p:sp>
+        <p:nvSpPr>
+          <p:cNvPr id="3" name="日期占位符 2"/>
           <p:cNvSpPr>
             <a:spLocks noGrp="1"/>
           </p:cNvSpPr>
@@ -1972,7 +1724,6 @@
           <a:p>
             <a:fld id="{51FD5836-1B78-4E70-983F-F8F353C30F27}" type="datetimeFigureOut">
               <a:rPr lang="zh-CN" altLang="en-US" smtClean="0"/>
-              <a:t>2024/5/23</a:t>
             </a:fld>
             <a:endParaRPr lang="zh-CN" altLang="en-US"/>
           </a:p>
@@ -1980,13 +1731,7 @@
       </p:sp>
       <p:sp>
         <p:nvSpPr>
-          <p:cNvPr id="4" name="页脚占位符 3">
-            <a:extLst>
-              <a:ext uri="{FF2B5EF4-FFF2-40B4-BE49-F238E27FC236}">
-                <a16:creationId xmlns:a16="http://schemas.microsoft.com/office/drawing/2014/main" id="{13921B6A-0B38-A13D-E1C9-ED13E632489D}"/>
-              </a:ext>
-            </a:extLst>
-          </p:cNvPr>
+          <p:cNvPr id="4" name="页脚占位符 3"/>
           <p:cNvSpPr>
             <a:spLocks noGrp="1"/>
           </p:cNvSpPr>
@@ -2005,13 +1750,7 @@
       </p:sp>
       <p:sp>
         <p:nvSpPr>
-          <p:cNvPr id="5" name="灯片编号占位符 4">
-            <a:extLst>
-              <a:ext uri="{FF2B5EF4-FFF2-40B4-BE49-F238E27FC236}">
-                <a16:creationId xmlns:a16="http://schemas.microsoft.com/office/drawing/2014/main" id="{8C3FBF4A-6923-96F3-4CCC-426EAAB5F085}"/>
-              </a:ext>
-            </a:extLst>
-          </p:cNvPr>
+          <p:cNvPr id="5" name="灯片编号占位符 4"/>
           <p:cNvSpPr>
             <a:spLocks noGrp="1"/>
           </p:cNvSpPr>
@@ -2026,18 +1765,12 @@
           <a:p>
             <a:fld id="{AB80B9A9-C03D-4F64-ADE2-7C0EC2978D5F}" type="slidenum">
               <a:rPr lang="zh-CN" altLang="en-US" smtClean="0"/>
-              <a:t>‹#›</a:t>
             </a:fld>
             <a:endParaRPr lang="zh-CN" altLang="en-US"/>
           </a:p>
         </p:txBody>
       </p:sp>
     </p:spTree>
-    <p:extLst>
-      <p:ext uri="{BB962C8B-B14F-4D97-AF65-F5344CB8AC3E}">
-        <p14:creationId xmlns:p14="http://schemas.microsoft.com/office/powerpoint/2010/main" val="3843442546"/>
-      </p:ext>
-    </p:extLst>
   </p:cSld>
   <p:clrMapOvr>
     <a:masterClrMapping/>
@@ -2064,13 +1797,7 @@
       </p:grpSpPr>
       <p:sp>
         <p:nvSpPr>
-          <p:cNvPr id="2" name="日期占位符 1">
-            <a:extLst>
-              <a:ext uri="{FF2B5EF4-FFF2-40B4-BE49-F238E27FC236}">
-                <a16:creationId xmlns:a16="http://schemas.microsoft.com/office/drawing/2014/main" id="{F6DBF4B0-B4CF-7031-B05A-375125398CC0}"/>
-              </a:ext>
-            </a:extLst>
-          </p:cNvPr>
+          <p:cNvPr id="2" name="日期占位符 1"/>
           <p:cNvSpPr>
             <a:spLocks noGrp="1"/>
           </p:cNvSpPr>
@@ -2085,7 +1812,6 @@
           <a:p>
             <a:fld id="{51FD5836-1B78-4E70-983F-F8F353C30F27}" type="datetimeFigureOut">
               <a:rPr lang="zh-CN" altLang="en-US" smtClean="0"/>
-              <a:t>2024/5/23</a:t>
             </a:fld>
             <a:endParaRPr lang="zh-CN" altLang="en-US"/>
           </a:p>
@@ -2093,13 +1819,7 @@
       </p:sp>
       <p:sp>
         <p:nvSpPr>
-          <p:cNvPr id="3" name="页脚占位符 2">
-            <a:extLst>
-              <a:ext uri="{FF2B5EF4-FFF2-40B4-BE49-F238E27FC236}">
-                <a16:creationId xmlns:a16="http://schemas.microsoft.com/office/drawing/2014/main" id="{9BF1C19B-ADDB-CC16-B9DA-2E3C0B566455}"/>
-              </a:ext>
-            </a:extLst>
-          </p:cNvPr>
+          <p:cNvPr id="3" name="页脚占位符 2"/>
           <p:cNvSpPr>
             <a:spLocks noGrp="1"/>
           </p:cNvSpPr>
@@ -2118,13 +1838,7 @@
       </p:sp>
       <p:sp>
         <p:nvSpPr>
-          <p:cNvPr id="4" name="灯片编号占位符 3">
-            <a:extLst>
-              <a:ext uri="{FF2B5EF4-FFF2-40B4-BE49-F238E27FC236}">
-                <a16:creationId xmlns:a16="http://schemas.microsoft.com/office/drawing/2014/main" id="{8519AD77-C9A3-0FA4-D45C-186F002BD7AF}"/>
-              </a:ext>
-            </a:extLst>
-          </p:cNvPr>
+          <p:cNvPr id="4" name="灯片编号占位符 3"/>
           <p:cNvSpPr>
             <a:spLocks noGrp="1"/>
           </p:cNvSpPr>
@@ -2139,18 +1853,12 @@
           <a:p>
             <a:fld id="{AB80B9A9-C03D-4F64-ADE2-7C0EC2978D5F}" type="slidenum">
               <a:rPr lang="zh-CN" altLang="en-US" smtClean="0"/>
-              <a:t>‹#›</a:t>
             </a:fld>
             <a:endParaRPr lang="zh-CN" altLang="en-US"/>
           </a:p>
         </p:txBody>
       </p:sp>
     </p:spTree>
-    <p:extLst>
-      <p:ext uri="{BB962C8B-B14F-4D97-AF65-F5344CB8AC3E}">
-        <p14:creationId xmlns:p14="http://schemas.microsoft.com/office/powerpoint/2010/main" val="2032795263"/>
-      </p:ext>
-    </p:extLst>
   </p:cSld>
   <p:clrMapOvr>
     <a:masterClrMapping/>
@@ -2177,13 +1885,7 @@
       </p:grpSpPr>
       <p:sp>
         <p:nvSpPr>
-          <p:cNvPr id="2" name="标题 1">
-            <a:extLst>
-              <a:ext uri="{FF2B5EF4-FFF2-40B4-BE49-F238E27FC236}">
-                <a16:creationId xmlns:a16="http://schemas.microsoft.com/office/drawing/2014/main" id="{2C00B875-2309-BDB1-DA9D-35537AA644A5}"/>
-              </a:ext>
-            </a:extLst>
-          </p:cNvPr>
+          <p:cNvPr id="2" name="标题 1"/>
           <p:cNvSpPr>
             <a:spLocks noGrp="1"/>
           </p:cNvSpPr>
@@ -2209,18 +1911,13 @@
               <a:rPr lang="zh-CN" altLang="en-US"/>
               <a:t>单击此处编辑母版标题样式</a:t>
             </a:r>
-          </a:p>
-        </p:txBody>
-      </p:sp>
-      <p:sp>
-        <p:nvSpPr>
-          <p:cNvPr id="3" name="内容占位符 2">
-            <a:extLst>
-              <a:ext uri="{FF2B5EF4-FFF2-40B4-BE49-F238E27FC236}">
-                <a16:creationId xmlns:a16="http://schemas.microsoft.com/office/drawing/2014/main" id="{E4E13892-F0C8-0EC5-9CE1-4FCD7805FA6C}"/>
-              </a:ext>
-            </a:extLst>
-          </p:cNvPr>
+            <a:endParaRPr lang="zh-CN" altLang="en-US"/>
+          </a:p>
+        </p:txBody>
+      </p:sp>
+      <p:sp>
+        <p:nvSpPr>
+          <p:cNvPr id="3" name="内容占位符 2"/>
           <p:cNvSpPr>
             <a:spLocks noGrp="1"/>
           </p:cNvSpPr>
@@ -2271,6 +1968,7 @@
               <a:rPr lang="zh-CN" altLang="en-US"/>
               <a:t>单击此处编辑母版文本样式</a:t>
             </a:r>
+            <a:endParaRPr lang="zh-CN" altLang="en-US"/>
           </a:p>
           <a:p>
             <a:pPr lvl="1"/>
@@ -2278,6 +1976,7 @@
               <a:rPr lang="zh-CN" altLang="en-US"/>
               <a:t>二级</a:t>
             </a:r>
+            <a:endParaRPr lang="zh-CN" altLang="en-US"/>
           </a:p>
           <a:p>
             <a:pPr lvl="2"/>
@@ -2285,6 +1984,7 @@
               <a:rPr lang="zh-CN" altLang="en-US"/>
               <a:t>三级</a:t>
             </a:r>
+            <a:endParaRPr lang="zh-CN" altLang="en-US"/>
           </a:p>
           <a:p>
             <a:pPr lvl="3"/>
@@ -2292,6 +1992,7 @@
               <a:rPr lang="zh-CN" altLang="en-US"/>
               <a:t>四级</a:t>
             </a:r>
+            <a:endParaRPr lang="zh-CN" altLang="en-US"/>
           </a:p>
           <a:p>
             <a:pPr lvl="4"/>
@@ -2299,18 +2000,13 @@
               <a:rPr lang="zh-CN" altLang="en-US"/>
               <a:t>五级</a:t>
             </a:r>
-          </a:p>
-        </p:txBody>
-      </p:sp>
-      <p:sp>
-        <p:nvSpPr>
-          <p:cNvPr id="4" name="文本占位符 3">
-            <a:extLst>
-              <a:ext uri="{FF2B5EF4-FFF2-40B4-BE49-F238E27FC236}">
-                <a16:creationId xmlns:a16="http://schemas.microsoft.com/office/drawing/2014/main" id="{EF0C9EFF-9C72-1CAF-AF85-09A3D5D104A7}"/>
-              </a:ext>
-            </a:extLst>
-          </p:cNvPr>
+            <a:endParaRPr lang="zh-CN" altLang="en-US"/>
+          </a:p>
+        </p:txBody>
+      </p:sp>
+      <p:sp>
+        <p:nvSpPr>
+          <p:cNvPr id="4" name="文本占位符 3"/>
           <p:cNvSpPr>
             <a:spLocks noGrp="1"/>
           </p:cNvSpPr>
@@ -2370,18 +2066,13 @@
               <a:rPr lang="zh-CN" altLang="en-US"/>
               <a:t>单击此处编辑母版文本样式</a:t>
             </a:r>
-          </a:p>
-        </p:txBody>
-      </p:sp>
-      <p:sp>
-        <p:nvSpPr>
-          <p:cNvPr id="5" name="日期占位符 4">
-            <a:extLst>
-              <a:ext uri="{FF2B5EF4-FFF2-40B4-BE49-F238E27FC236}">
-                <a16:creationId xmlns:a16="http://schemas.microsoft.com/office/drawing/2014/main" id="{0E69CBAE-63A2-15DC-D96A-09FC154ACF42}"/>
-              </a:ext>
-            </a:extLst>
-          </p:cNvPr>
+            <a:endParaRPr lang="zh-CN" altLang="en-US"/>
+          </a:p>
+        </p:txBody>
+      </p:sp>
+      <p:sp>
+        <p:nvSpPr>
+          <p:cNvPr id="5" name="日期占位符 4"/>
           <p:cNvSpPr>
             <a:spLocks noGrp="1"/>
           </p:cNvSpPr>
@@ -2396,7 +2087,6 @@
           <a:p>
             <a:fld id="{51FD5836-1B78-4E70-983F-F8F353C30F27}" type="datetimeFigureOut">
               <a:rPr lang="zh-CN" altLang="en-US" smtClean="0"/>
-              <a:t>2024/5/23</a:t>
             </a:fld>
             <a:endParaRPr lang="zh-CN" altLang="en-US"/>
           </a:p>
@@ -2404,13 +2094,7 @@
       </p:sp>
       <p:sp>
         <p:nvSpPr>
-          <p:cNvPr id="6" name="页脚占位符 5">
-            <a:extLst>
-              <a:ext uri="{FF2B5EF4-FFF2-40B4-BE49-F238E27FC236}">
-                <a16:creationId xmlns:a16="http://schemas.microsoft.com/office/drawing/2014/main" id="{FCC53D46-0886-1BEA-6337-5334196F4897}"/>
-              </a:ext>
-            </a:extLst>
-          </p:cNvPr>
+          <p:cNvPr id="6" name="页脚占位符 5"/>
           <p:cNvSpPr>
             <a:spLocks noGrp="1"/>
           </p:cNvSpPr>
@@ -2429,13 +2113,7 @@
       </p:sp>
       <p:sp>
         <p:nvSpPr>
-          <p:cNvPr id="7" name="灯片编号占位符 6">
-            <a:extLst>
-              <a:ext uri="{FF2B5EF4-FFF2-40B4-BE49-F238E27FC236}">
-                <a16:creationId xmlns:a16="http://schemas.microsoft.com/office/drawing/2014/main" id="{1CC2CF55-3BC5-E170-6EF3-3EE27595186B}"/>
-              </a:ext>
-            </a:extLst>
-          </p:cNvPr>
+          <p:cNvPr id="7" name="灯片编号占位符 6"/>
           <p:cNvSpPr>
             <a:spLocks noGrp="1"/>
           </p:cNvSpPr>
@@ -2450,18 +2128,12 @@
           <a:p>
             <a:fld id="{AB80B9A9-C03D-4F64-ADE2-7C0EC2978D5F}" type="slidenum">
               <a:rPr lang="zh-CN" altLang="en-US" smtClean="0"/>
-              <a:t>‹#›</a:t>
             </a:fld>
             <a:endParaRPr lang="zh-CN" altLang="en-US"/>
           </a:p>
         </p:txBody>
       </p:sp>
     </p:spTree>
-    <p:extLst>
-      <p:ext uri="{BB962C8B-B14F-4D97-AF65-F5344CB8AC3E}">
-        <p14:creationId xmlns:p14="http://schemas.microsoft.com/office/powerpoint/2010/main" val="4257840622"/>
-      </p:ext>
-    </p:extLst>
   </p:cSld>
   <p:clrMapOvr>
     <a:masterClrMapping/>
@@ -2488,13 +2160,7 @@
       </p:grpSpPr>
       <p:sp>
         <p:nvSpPr>
-          <p:cNvPr id="2" name="标题 1">
-            <a:extLst>
-              <a:ext uri="{FF2B5EF4-FFF2-40B4-BE49-F238E27FC236}">
-                <a16:creationId xmlns:a16="http://schemas.microsoft.com/office/drawing/2014/main" id="{D70F4F0D-3C59-2760-A146-6138A34B2D4D}"/>
-              </a:ext>
-            </a:extLst>
-          </p:cNvPr>
+          <p:cNvPr id="2" name="标题 1"/>
           <p:cNvSpPr>
             <a:spLocks noGrp="1"/>
           </p:cNvSpPr>
@@ -2520,18 +2186,13 @@
               <a:rPr lang="zh-CN" altLang="en-US"/>
               <a:t>单击此处编辑母版标题样式</a:t>
             </a:r>
-          </a:p>
-        </p:txBody>
-      </p:sp>
-      <p:sp>
-        <p:nvSpPr>
-          <p:cNvPr id="3" name="图片占位符 2">
-            <a:extLst>
-              <a:ext uri="{FF2B5EF4-FFF2-40B4-BE49-F238E27FC236}">
-                <a16:creationId xmlns:a16="http://schemas.microsoft.com/office/drawing/2014/main" id="{3CD8962C-7900-0BC0-1F8B-3919AEFDE1BC}"/>
-              </a:ext>
-            </a:extLst>
-          </p:cNvPr>
+            <a:endParaRPr lang="zh-CN" altLang="en-US"/>
+          </a:p>
+        </p:txBody>
+      </p:sp>
+      <p:sp>
+        <p:nvSpPr>
+          <p:cNvPr id="3" name="图片占位符 2"/>
           <p:cNvSpPr>
             <a:spLocks noGrp="1"/>
           </p:cNvSpPr>
@@ -2592,13 +2253,7 @@
       </p:sp>
       <p:sp>
         <p:nvSpPr>
-          <p:cNvPr id="4" name="文本占位符 3">
-            <a:extLst>
-              <a:ext uri="{FF2B5EF4-FFF2-40B4-BE49-F238E27FC236}">
-                <a16:creationId xmlns:a16="http://schemas.microsoft.com/office/drawing/2014/main" id="{455867B0-94C7-9AD7-DA91-F7F47CF89E1D}"/>
-              </a:ext>
-            </a:extLst>
-          </p:cNvPr>
+          <p:cNvPr id="4" name="文本占位符 3"/>
           <p:cNvSpPr>
             <a:spLocks noGrp="1"/>
           </p:cNvSpPr>
@@ -2658,18 +2313,13 @@
               <a:rPr lang="zh-CN" altLang="en-US"/>
               <a:t>单击此处编辑母版文本样式</a:t>
             </a:r>
-          </a:p>
-        </p:txBody>
-      </p:sp>
-      <p:sp>
-        <p:nvSpPr>
-          <p:cNvPr id="5" name="日期占位符 4">
-            <a:extLst>
-              <a:ext uri="{FF2B5EF4-FFF2-40B4-BE49-F238E27FC236}">
-                <a16:creationId xmlns:a16="http://schemas.microsoft.com/office/drawing/2014/main" id="{CDC0BA10-2EE2-052E-AD1B-05BFD5D1A9DB}"/>
-              </a:ext>
-            </a:extLst>
-          </p:cNvPr>
+            <a:endParaRPr lang="zh-CN" altLang="en-US"/>
+          </a:p>
+        </p:txBody>
+      </p:sp>
+      <p:sp>
+        <p:nvSpPr>
+          <p:cNvPr id="5" name="日期占位符 4"/>
           <p:cNvSpPr>
             <a:spLocks noGrp="1"/>
           </p:cNvSpPr>
@@ -2684,7 +2334,6 @@
           <a:p>
             <a:fld id="{51FD5836-1B78-4E70-983F-F8F353C30F27}" type="datetimeFigureOut">
               <a:rPr lang="zh-CN" altLang="en-US" smtClean="0"/>
-              <a:t>2024/5/23</a:t>
             </a:fld>
             <a:endParaRPr lang="zh-CN" altLang="en-US"/>
           </a:p>
@@ -2692,13 +2341,7 @@
       </p:sp>
       <p:sp>
         <p:nvSpPr>
-          <p:cNvPr id="6" name="页脚占位符 5">
-            <a:extLst>
-              <a:ext uri="{FF2B5EF4-FFF2-40B4-BE49-F238E27FC236}">
-                <a16:creationId xmlns:a16="http://schemas.microsoft.com/office/drawing/2014/main" id="{AA3F60E2-D3B9-8987-93F0-4853E88B7359}"/>
-              </a:ext>
-            </a:extLst>
-          </p:cNvPr>
+          <p:cNvPr id="6" name="页脚占位符 5"/>
           <p:cNvSpPr>
             <a:spLocks noGrp="1"/>
           </p:cNvSpPr>
@@ -2717,13 +2360,7 @@
       </p:sp>
       <p:sp>
         <p:nvSpPr>
-          <p:cNvPr id="7" name="灯片编号占位符 6">
-            <a:extLst>
-              <a:ext uri="{FF2B5EF4-FFF2-40B4-BE49-F238E27FC236}">
-                <a16:creationId xmlns:a16="http://schemas.microsoft.com/office/drawing/2014/main" id="{BCE4ABD0-0B5A-5E74-4B39-594833D639BA}"/>
-              </a:ext>
-            </a:extLst>
-          </p:cNvPr>
+          <p:cNvPr id="7" name="灯片编号占位符 6"/>
           <p:cNvSpPr>
             <a:spLocks noGrp="1"/>
           </p:cNvSpPr>
@@ -2738,18 +2375,12 @@
           <a:p>
             <a:fld id="{AB80B9A9-C03D-4F64-ADE2-7C0EC2978D5F}" type="slidenum">
               <a:rPr lang="zh-CN" altLang="en-US" smtClean="0"/>
-              <a:t>‹#›</a:t>
             </a:fld>
             <a:endParaRPr lang="zh-CN" altLang="en-US"/>
           </a:p>
         </p:txBody>
       </p:sp>
     </p:spTree>
-    <p:extLst>
-      <p:ext uri="{BB962C8B-B14F-4D97-AF65-F5344CB8AC3E}">
-        <p14:creationId xmlns:p14="http://schemas.microsoft.com/office/powerpoint/2010/main" val="2732347102"/>
-      </p:ext>
-    </p:extLst>
   </p:cSld>
   <p:clrMapOvr>
     <a:masterClrMapping/>
@@ -2781,13 +2412,7 @@
       </p:grpSpPr>
       <p:sp>
         <p:nvSpPr>
-          <p:cNvPr id="2" name="标题占位符 1">
-            <a:extLst>
-              <a:ext uri="{FF2B5EF4-FFF2-40B4-BE49-F238E27FC236}">
-                <a16:creationId xmlns:a16="http://schemas.microsoft.com/office/drawing/2014/main" id="{2319F1BD-AFB5-61DA-7E47-828688908BCD}"/>
-              </a:ext>
-            </a:extLst>
-          </p:cNvPr>
+          <p:cNvPr id="2" name="标题占位符 1"/>
           <p:cNvSpPr>
             <a:spLocks noGrp="1"/>
           </p:cNvSpPr>
@@ -2814,18 +2439,13 @@
               <a:rPr lang="zh-CN" altLang="en-US"/>
               <a:t>单击此处编辑母版标题样式</a:t>
             </a:r>
-          </a:p>
-        </p:txBody>
-      </p:sp>
-      <p:sp>
-        <p:nvSpPr>
-          <p:cNvPr id="3" name="文本占位符 2">
-            <a:extLst>
-              <a:ext uri="{FF2B5EF4-FFF2-40B4-BE49-F238E27FC236}">
-                <a16:creationId xmlns:a16="http://schemas.microsoft.com/office/drawing/2014/main" id="{7B5FFBF3-0F68-DE9A-171D-06956400D4CB}"/>
-              </a:ext>
-            </a:extLst>
-          </p:cNvPr>
+            <a:endParaRPr lang="zh-CN" altLang="en-US"/>
+          </a:p>
+        </p:txBody>
+      </p:sp>
+      <p:sp>
+        <p:nvSpPr>
+          <p:cNvPr id="3" name="文本占位符 2"/>
           <p:cNvSpPr>
             <a:spLocks noGrp="1"/>
           </p:cNvSpPr>
@@ -2853,6 +2473,7 @@
               <a:rPr lang="zh-CN" altLang="en-US"/>
               <a:t>单击此处编辑母版文本样式</a:t>
             </a:r>
+            <a:endParaRPr lang="zh-CN" altLang="en-US"/>
           </a:p>
           <a:p>
             <a:pPr lvl="1"/>
@@ -2860,6 +2481,7 @@
               <a:rPr lang="zh-CN" altLang="en-US"/>
               <a:t>二级</a:t>
             </a:r>
+            <a:endParaRPr lang="zh-CN" altLang="en-US"/>
           </a:p>
           <a:p>
             <a:pPr lvl="2"/>
@@ -2867,6 +2489,7 @@
               <a:rPr lang="zh-CN" altLang="en-US"/>
               <a:t>三级</a:t>
             </a:r>
+            <a:endParaRPr lang="zh-CN" altLang="en-US"/>
           </a:p>
           <a:p>
             <a:pPr lvl="3"/>
@@ -2874,6 +2497,7 @@
               <a:rPr lang="zh-CN" altLang="en-US"/>
               <a:t>四级</a:t>
             </a:r>
+            <a:endParaRPr lang="zh-CN" altLang="en-US"/>
           </a:p>
           <a:p>
             <a:pPr lvl="4"/>
@@ -2881,18 +2505,13 @@
               <a:rPr lang="zh-CN" altLang="en-US"/>
               <a:t>五级</a:t>
             </a:r>
-          </a:p>
-        </p:txBody>
-      </p:sp>
-      <p:sp>
-        <p:nvSpPr>
-          <p:cNvPr id="4" name="日期占位符 3">
-            <a:extLst>
-              <a:ext uri="{FF2B5EF4-FFF2-40B4-BE49-F238E27FC236}">
-                <a16:creationId xmlns:a16="http://schemas.microsoft.com/office/drawing/2014/main" id="{ED80AD44-21C1-EC3D-F394-13517E0D857D}"/>
-              </a:ext>
-            </a:extLst>
-          </p:cNvPr>
+            <a:endParaRPr lang="zh-CN" altLang="en-US"/>
+          </a:p>
+        </p:txBody>
+      </p:sp>
+      <p:sp>
+        <p:nvSpPr>
+          <p:cNvPr id="4" name="日期占位符 3"/>
           <p:cNvSpPr>
             <a:spLocks noGrp="1"/>
           </p:cNvSpPr>
@@ -2925,7 +2544,6 @@
           <a:p>
             <a:fld id="{51FD5836-1B78-4E70-983F-F8F353C30F27}" type="datetimeFigureOut">
               <a:rPr lang="zh-CN" altLang="en-US" smtClean="0"/>
-              <a:t>2024/5/23</a:t>
             </a:fld>
             <a:endParaRPr lang="zh-CN" altLang="en-US"/>
           </a:p>
@@ -2933,13 +2551,7 @@
       </p:sp>
       <p:sp>
         <p:nvSpPr>
-          <p:cNvPr id="5" name="页脚占位符 4">
-            <a:extLst>
-              <a:ext uri="{FF2B5EF4-FFF2-40B4-BE49-F238E27FC236}">
-                <a16:creationId xmlns:a16="http://schemas.microsoft.com/office/drawing/2014/main" id="{136DC39D-6AF0-5BC2-75AC-C6865F962B9B}"/>
-              </a:ext>
-            </a:extLst>
-          </p:cNvPr>
+          <p:cNvPr id="5" name="页脚占位符 4"/>
           <p:cNvSpPr>
             <a:spLocks noGrp="1"/>
           </p:cNvSpPr>
@@ -2976,13 +2588,7 @@
       </p:sp>
       <p:sp>
         <p:nvSpPr>
-          <p:cNvPr id="6" name="灯片编号占位符 5">
-            <a:extLst>
-              <a:ext uri="{FF2B5EF4-FFF2-40B4-BE49-F238E27FC236}">
-                <a16:creationId xmlns:a16="http://schemas.microsoft.com/office/drawing/2014/main" id="{E6F69D94-CA5B-9C6A-1095-06A6F069A627}"/>
-              </a:ext>
-            </a:extLst>
-          </p:cNvPr>
+          <p:cNvPr id="6" name="灯片编号占位符 5"/>
           <p:cNvSpPr>
             <a:spLocks noGrp="1"/>
           </p:cNvSpPr>
@@ -3015,18 +2621,12 @@
           <a:p>
             <a:fld id="{AB80B9A9-C03D-4F64-ADE2-7C0EC2978D5F}" type="slidenum">
               <a:rPr lang="zh-CN" altLang="en-US" smtClean="0"/>
-              <a:t>‹#›</a:t>
             </a:fld>
             <a:endParaRPr lang="zh-CN" altLang="en-US"/>
           </a:p>
         </p:txBody>
       </p:sp>
     </p:spTree>
-    <p:extLst>
-      <p:ext uri="{BB962C8B-B14F-4D97-AF65-F5344CB8AC3E}">
-        <p14:creationId xmlns:p14="http://schemas.microsoft.com/office/powerpoint/2010/main" val="4182881793"/>
-      </p:ext>
-    </p:extLst>
   </p:cSld>
   <p:clrMap bg1="lt1" tx1="dk1" bg2="lt2" tx2="dk2" accent1="accent1" accent2="accent2" accent3="accent3" accent4="accent4" accent5="accent5" accent6="accent6" hlink="hlink" folHlink="folHlink"/>
   <p:sldLayoutIdLst>
@@ -3070,7 +2670,7 @@
         <a:spcBef>
           <a:spcPts val="1000"/>
         </a:spcBef>
-        <a:buFont typeface="Arial" panose="020B0604020202020204" pitchFamily="34" charset="0"/>
+        <a:buFont typeface="Arial" panose="020B0604020202090204" pitchFamily="34" charset="0"/>
         <a:buChar char="•"/>
         <a:defRPr sz="2800" kern="1200">
           <a:solidFill>
@@ -3088,7 +2688,7 @@
         <a:spcBef>
           <a:spcPts val="500"/>
         </a:spcBef>
-        <a:buFont typeface="Arial" panose="020B0604020202020204" pitchFamily="34" charset="0"/>
+        <a:buFont typeface="Arial" panose="020B0604020202090204" pitchFamily="34" charset="0"/>
         <a:buChar char="•"/>
         <a:defRPr sz="2400" kern="1200">
           <a:solidFill>
@@ -3106,7 +2706,7 @@
         <a:spcBef>
           <a:spcPts val="500"/>
         </a:spcBef>
-        <a:buFont typeface="Arial" panose="020B0604020202020204" pitchFamily="34" charset="0"/>
+        <a:buFont typeface="Arial" panose="020B0604020202090204" pitchFamily="34" charset="0"/>
         <a:buChar char="•"/>
         <a:defRPr sz="2000" kern="1200">
           <a:solidFill>
@@ -3124,7 +2724,7 @@
         <a:spcBef>
           <a:spcPts val="500"/>
         </a:spcBef>
-        <a:buFont typeface="Arial" panose="020B0604020202020204" pitchFamily="34" charset="0"/>
+        <a:buFont typeface="Arial" panose="020B0604020202090204" pitchFamily="34" charset="0"/>
         <a:buChar char="•"/>
         <a:defRPr sz="1800" kern="1200">
           <a:solidFill>
@@ -3142,7 +2742,7 @@
         <a:spcBef>
           <a:spcPts val="500"/>
         </a:spcBef>
-        <a:buFont typeface="Arial" panose="020B0604020202020204" pitchFamily="34" charset="0"/>
+        <a:buFont typeface="Arial" panose="020B0604020202090204" pitchFamily="34" charset="0"/>
         <a:buChar char="•"/>
         <a:defRPr sz="1800" kern="1200">
           <a:solidFill>
@@ -3160,7 +2760,7 @@
         <a:spcBef>
           <a:spcPts val="500"/>
         </a:spcBef>
-        <a:buFont typeface="Arial" panose="020B0604020202020204" pitchFamily="34" charset="0"/>
+        <a:buFont typeface="Arial" panose="020B0604020202090204" pitchFamily="34" charset="0"/>
         <a:buChar char="•"/>
         <a:defRPr sz="1800" kern="1200">
           <a:solidFill>
@@ -3178,7 +2778,7 @@
         <a:spcBef>
           <a:spcPts val="500"/>
         </a:spcBef>
-        <a:buFont typeface="Arial" panose="020B0604020202020204" pitchFamily="34" charset="0"/>
+        <a:buFont typeface="Arial" panose="020B0604020202090204" pitchFamily="34" charset="0"/>
         <a:buChar char="•"/>
         <a:defRPr sz="1800" kern="1200">
           <a:solidFill>
@@ -3196,7 +2796,7 @@
         <a:spcBef>
           <a:spcPts val="500"/>
         </a:spcBef>
-        <a:buFont typeface="Arial" panose="020B0604020202020204" pitchFamily="34" charset="0"/>
+        <a:buFont typeface="Arial" panose="020B0604020202090204" pitchFamily="34" charset="0"/>
         <a:buChar char="•"/>
         <a:defRPr sz="1800" kern="1200">
           <a:solidFill>
@@ -3214,7 +2814,7 @@
         <a:spcBef>
           <a:spcPts val="500"/>
         </a:spcBef>
-        <a:buFont typeface="Arial" panose="020B0604020202020204" pitchFamily="34" charset="0"/>
+        <a:buFont typeface="Arial" panose="020B0604020202090204" pitchFamily="34" charset="0"/>
         <a:buChar char="•"/>
         <a:defRPr sz="1800" kern="1200">
           <a:solidFill>
@@ -3344,13 +2944,7 @@
       </p:grpSpPr>
       <p:sp>
         <p:nvSpPr>
-          <p:cNvPr id="2" name="标题 1">
-            <a:extLst>
-              <a:ext uri="{FF2B5EF4-FFF2-40B4-BE49-F238E27FC236}">
-                <a16:creationId xmlns:a16="http://schemas.microsoft.com/office/drawing/2014/main" id="{643627E4-3D66-D01B-F68A-5EF8F5966777}"/>
-              </a:ext>
-            </a:extLst>
-          </p:cNvPr>
+          <p:cNvPr id="2" name="标题 1"/>
           <p:cNvSpPr>
             <a:spLocks noGrp="1"/>
           </p:cNvSpPr>
@@ -3373,13 +2967,7 @@
       </p:sp>
       <p:sp>
         <p:nvSpPr>
-          <p:cNvPr id="3" name="副标题 2">
-            <a:extLst>
-              <a:ext uri="{FF2B5EF4-FFF2-40B4-BE49-F238E27FC236}">
-                <a16:creationId xmlns:a16="http://schemas.microsoft.com/office/drawing/2014/main" id="{9941ACF3-54B9-CF6D-4AFC-71BD6B50B5CC}"/>
-              </a:ext>
-            </a:extLst>
-          </p:cNvPr>
+          <p:cNvPr id="3" name="副标题 2"/>
           <p:cNvSpPr>
             <a:spLocks noGrp="1"/>
           </p:cNvSpPr>
@@ -3397,11 +2985,6 @@
         </p:txBody>
       </p:sp>
     </p:spTree>
-    <p:extLst>
-      <p:ext uri="{BB962C8B-B14F-4D97-AF65-F5344CB8AC3E}">
-        <p14:creationId xmlns:p14="http://schemas.microsoft.com/office/powerpoint/2010/main" val="2737774238"/>
-      </p:ext>
-    </p:extLst>
   </p:cSld>
   <p:clrMapOvr>
     <a:masterClrMapping/>
@@ -3428,13 +3011,7 @@
       </p:grpSpPr>
       <p:sp>
         <p:nvSpPr>
-          <p:cNvPr id="2" name="标题 1">
-            <a:extLst>
-              <a:ext uri="{FF2B5EF4-FFF2-40B4-BE49-F238E27FC236}">
-                <a16:creationId xmlns:a16="http://schemas.microsoft.com/office/drawing/2014/main" id="{F24B1AC8-C346-C066-8312-EC4669007BC2}"/>
-              </a:ext>
-            </a:extLst>
-          </p:cNvPr>
+          <p:cNvPr id="2" name="标题 1"/>
           <p:cNvSpPr>
             <a:spLocks noGrp="1"/>
           </p:cNvSpPr>
@@ -3464,13 +3041,7 @@
       </p:sp>
       <p:sp>
         <p:nvSpPr>
-          <p:cNvPr id="3" name="内容占位符 2">
-            <a:extLst>
-              <a:ext uri="{FF2B5EF4-FFF2-40B4-BE49-F238E27FC236}">
-                <a16:creationId xmlns:a16="http://schemas.microsoft.com/office/drawing/2014/main" id="{48E70D3F-7BCE-F295-1DBC-CFC2BC54F02B}"/>
-              </a:ext>
-            </a:extLst>
-          </p:cNvPr>
+          <p:cNvPr id="3" name="内容占位符 2"/>
           <p:cNvSpPr>
             <a:spLocks noGrp="1"/>
           </p:cNvSpPr>
@@ -3658,20 +3229,14 @@
       </p:sp>
       <p:pic>
         <p:nvPicPr>
-          <p:cNvPr id="9" name="图片 8">
-            <a:extLst>
-              <a:ext uri="{FF2B5EF4-FFF2-40B4-BE49-F238E27FC236}">
-                <a16:creationId xmlns:a16="http://schemas.microsoft.com/office/drawing/2014/main" id="{F3083EF5-D78C-2A6E-E1E2-1EE1CD37242B}"/>
-              </a:ext>
-            </a:extLst>
-          </p:cNvPr>
+          <p:cNvPr id="9" name="图片 8"/>
           <p:cNvPicPr>
             <a:picLocks noChangeAspect="1"/>
           </p:cNvPicPr>
           <p:nvPr/>
         </p:nvPicPr>
         <p:blipFill>
-          <a:blip r:embed="rId2"/>
+          <a:blip r:embed="rId1"/>
           <a:stretch>
             <a:fillRect/>
           </a:stretch>
@@ -3687,11 +3252,6 @@
         </p:spPr>
       </p:pic>
     </p:spTree>
-    <p:extLst>
-      <p:ext uri="{BB962C8B-B14F-4D97-AF65-F5344CB8AC3E}">
-        <p14:creationId xmlns:p14="http://schemas.microsoft.com/office/powerpoint/2010/main" val="3771486269"/>
-      </p:ext>
-    </p:extLst>
   </p:cSld>
   <p:clrMapOvr>
     <a:masterClrMapping/>
@@ -3718,13 +3278,7 @@
       </p:grpSpPr>
       <p:sp>
         <p:nvSpPr>
-          <p:cNvPr id="2" name="标题 1">
-            <a:extLst>
-              <a:ext uri="{FF2B5EF4-FFF2-40B4-BE49-F238E27FC236}">
-                <a16:creationId xmlns:a16="http://schemas.microsoft.com/office/drawing/2014/main" id="{F24B1AC8-C346-C066-8312-EC4669007BC2}"/>
-              </a:ext>
-            </a:extLst>
-          </p:cNvPr>
+          <p:cNvPr id="2" name="标题 1"/>
           <p:cNvSpPr>
             <a:spLocks noGrp="1"/>
           </p:cNvSpPr>
@@ -3754,13 +3308,7 @@
       </p:sp>
       <p:sp>
         <p:nvSpPr>
-          <p:cNvPr id="3" name="内容占位符 2">
-            <a:extLst>
-              <a:ext uri="{FF2B5EF4-FFF2-40B4-BE49-F238E27FC236}">
-                <a16:creationId xmlns:a16="http://schemas.microsoft.com/office/drawing/2014/main" id="{48E70D3F-7BCE-F295-1DBC-CFC2BC54F02B}"/>
-              </a:ext>
-            </a:extLst>
-          </p:cNvPr>
+          <p:cNvPr id="3" name="内容占位符 2"/>
           <p:cNvSpPr>
             <a:spLocks noGrp="1"/>
           </p:cNvSpPr>
@@ -3784,6 +3332,13 @@
               <a:rPr lang="zh-CN" altLang="en-US" sz="2000" dirty="0"/>
               <a:t>轮询点：执行器在需要选择下一个要执行的实例但当前没有可用实例时会到达轮询点。</a:t>
             </a:r>
+            <a:endParaRPr lang="zh-CN" altLang="en-US" sz="2000" dirty="0"/>
+          </a:p>
+          <a:p>
+            <a:r>
+              <a:rPr lang="zh-CN" altLang="en-US" sz="2000" dirty="0"/>
+              <a:t>处理窗口：两个轮询点之间。</a:t>
+            </a:r>
             <a:endParaRPr lang="en-US" altLang="zh-CN" sz="2000" dirty="0"/>
           </a:p>
           <a:p>
@@ -3901,20 +3456,14 @@
       </p:sp>
       <p:pic>
         <p:nvPicPr>
-          <p:cNvPr id="5" name="图片 4">
-            <a:extLst>
-              <a:ext uri="{FF2B5EF4-FFF2-40B4-BE49-F238E27FC236}">
-                <a16:creationId xmlns:a16="http://schemas.microsoft.com/office/drawing/2014/main" id="{31F7852E-FF43-2AC8-8707-8A856BFC1AB2}"/>
-              </a:ext>
-            </a:extLst>
-          </p:cNvPr>
+          <p:cNvPr id="5" name="图片 4"/>
           <p:cNvPicPr>
             <a:picLocks noChangeAspect="1"/>
           </p:cNvPicPr>
           <p:nvPr/>
         </p:nvPicPr>
         <p:blipFill>
-          <a:blip r:embed="rId2"/>
+          <a:blip r:embed="rId1"/>
           <a:stretch>
             <a:fillRect/>
           </a:stretch>
@@ -3930,11 +3479,6 @@
         </p:spPr>
       </p:pic>
     </p:spTree>
-    <p:extLst>
-      <p:ext uri="{BB962C8B-B14F-4D97-AF65-F5344CB8AC3E}">
-        <p14:creationId xmlns:p14="http://schemas.microsoft.com/office/powerpoint/2010/main" val="2604598608"/>
-      </p:ext>
-    </p:extLst>
   </p:cSld>
   <p:clrMapOvr>
     <a:masterClrMapping/>
@@ -3961,13 +3505,7 @@
       </p:grpSpPr>
       <p:sp>
         <p:nvSpPr>
-          <p:cNvPr id="2" name="标题 1">
-            <a:extLst>
-              <a:ext uri="{FF2B5EF4-FFF2-40B4-BE49-F238E27FC236}">
-                <a16:creationId xmlns:a16="http://schemas.microsoft.com/office/drawing/2014/main" id="{F24B1AC8-C346-C066-8312-EC4669007BC2}"/>
-              </a:ext>
-            </a:extLst>
-          </p:cNvPr>
+          <p:cNvPr id="2" name="标题 1"/>
           <p:cNvSpPr>
             <a:spLocks noGrp="1"/>
           </p:cNvSpPr>
@@ -3997,13 +3535,7 @@
       </p:sp>
       <p:sp>
         <p:nvSpPr>
-          <p:cNvPr id="3" name="内容占位符 2">
-            <a:extLst>
-              <a:ext uri="{FF2B5EF4-FFF2-40B4-BE49-F238E27FC236}">
-                <a16:creationId xmlns:a16="http://schemas.microsoft.com/office/drawing/2014/main" id="{48E70D3F-7BCE-F295-1DBC-CFC2BC54F02B}"/>
-              </a:ext>
-            </a:extLst>
-          </p:cNvPr>
+          <p:cNvPr id="3" name="内容占位符 2"/>
           <p:cNvSpPr>
             <a:spLocks noGrp="1"/>
           </p:cNvSpPr>
@@ -4223,6 +3755,7 @@
               <a:rPr lang="en-US" altLang="zh-CN" sz="1600" dirty="0"/>
               <a:t>_{z}$ </a:t>
             </a:r>
+            <a:endParaRPr lang="en-US" altLang="zh-CN" sz="1600" dirty="0"/>
           </a:p>
           <a:p>
             <a:pPr marL="457200" lvl="1" indent="0">
@@ -4234,22 +3767,18 @@
       </p:sp>
       <p:pic>
         <p:nvPicPr>
-          <p:cNvPr id="5" name="图片 4">
-            <a:extLst>
-              <a:ext uri="{FF2B5EF4-FFF2-40B4-BE49-F238E27FC236}">
-                <a16:creationId xmlns:a16="http://schemas.microsoft.com/office/drawing/2014/main" id="{198C5037-9F4E-406D-D228-EBD7A3F48BD6}"/>
-              </a:ext>
-            </a:extLst>
-          </p:cNvPr>
+          <p:cNvPr id="5" name="图片 4"/>
           <p:cNvPicPr>
             <a:picLocks noChangeAspect="1"/>
           </p:cNvPicPr>
           <p:nvPr/>
         </p:nvPicPr>
         <p:blipFill rotWithShape="1">
-          <a:blip r:embed="rId2"/>
+          <a:blip r:embed="rId1"/>
           <a:srcRect l="3516"/>
-          <a:stretch/>
+          <a:stretch>
+            <a:fillRect/>
+          </a:stretch>
         </p:blipFill>
         <p:spPr>
           <a:xfrm>
@@ -4263,20 +3792,14 @@
       </p:pic>
       <p:pic>
         <p:nvPicPr>
-          <p:cNvPr id="7" name="图片 6">
-            <a:extLst>
-              <a:ext uri="{FF2B5EF4-FFF2-40B4-BE49-F238E27FC236}">
-                <a16:creationId xmlns:a16="http://schemas.microsoft.com/office/drawing/2014/main" id="{E9E73501-F548-34AA-A9A3-DC3D2F590546}"/>
-              </a:ext>
-            </a:extLst>
-          </p:cNvPr>
+          <p:cNvPr id="7" name="图片 6"/>
           <p:cNvPicPr>
             <a:picLocks noChangeAspect="1"/>
           </p:cNvPicPr>
           <p:nvPr/>
         </p:nvPicPr>
         <p:blipFill>
-          <a:blip r:embed="rId3"/>
+          <a:blip r:embed="rId2"/>
           <a:stretch>
             <a:fillRect/>
           </a:stretch>
@@ -4292,11 +3815,6 @@
         </p:spPr>
       </p:pic>
     </p:spTree>
-    <p:extLst>
-      <p:ext uri="{BB962C8B-B14F-4D97-AF65-F5344CB8AC3E}">
-        <p14:creationId xmlns:p14="http://schemas.microsoft.com/office/powerpoint/2010/main" val="2821725175"/>
-      </p:ext>
-    </p:extLst>
   </p:cSld>
   <p:clrMapOvr>
     <a:masterClrMapping/>
@@ -4323,13 +3841,7 @@
       </p:grpSpPr>
       <p:sp>
         <p:nvSpPr>
-          <p:cNvPr id="2" name="标题 1">
-            <a:extLst>
-              <a:ext uri="{FF2B5EF4-FFF2-40B4-BE49-F238E27FC236}">
-                <a16:creationId xmlns:a16="http://schemas.microsoft.com/office/drawing/2014/main" id="{F24B1AC8-C346-C066-8312-EC4669007BC2}"/>
-              </a:ext>
-            </a:extLst>
-          </p:cNvPr>
+          <p:cNvPr id="2" name="标题 1"/>
           <p:cNvSpPr>
             <a:spLocks noGrp="1"/>
           </p:cNvSpPr>
@@ -4359,13 +3871,7 @@
       </p:sp>
       <p:sp>
         <p:nvSpPr>
-          <p:cNvPr id="3" name="内容占位符 2">
-            <a:extLst>
-              <a:ext uri="{FF2B5EF4-FFF2-40B4-BE49-F238E27FC236}">
-                <a16:creationId xmlns:a16="http://schemas.microsoft.com/office/drawing/2014/main" id="{48E70D3F-7BCE-F295-1DBC-CFC2BC54F02B}"/>
-              </a:ext>
-            </a:extLst>
-          </p:cNvPr>
+          <p:cNvPr id="3" name="内容占位符 2"/>
           <p:cNvSpPr>
             <a:spLocks noGrp="1"/>
           </p:cNvSpPr>
@@ -4597,6 +4103,7 @@
               <a:rPr lang="en-US" altLang="zh-CN" sz="1600" dirty="0"/>
               <a:t>pivot</a:t>
             </a:r>
+            <a:endParaRPr lang="en-US" altLang="zh-CN" sz="1600" dirty="0"/>
           </a:p>
           <a:p>
             <a:pPr lvl="1"/>
@@ -4625,11 +4132,6 @@
         </p:txBody>
       </p:sp>
     </p:spTree>
-    <p:extLst>
-      <p:ext uri="{BB962C8B-B14F-4D97-AF65-F5344CB8AC3E}">
-        <p14:creationId xmlns:p14="http://schemas.microsoft.com/office/powerpoint/2010/main" val="2552437054"/>
-      </p:ext>
-    </p:extLst>
   </p:cSld>
   <p:clrMapOvr>
     <a:masterClrMapping/>
@@ -4656,13 +4158,7 @@
       </p:grpSpPr>
       <p:sp>
         <p:nvSpPr>
-          <p:cNvPr id="2" name="标题 1">
-            <a:extLst>
-              <a:ext uri="{FF2B5EF4-FFF2-40B4-BE49-F238E27FC236}">
-                <a16:creationId xmlns:a16="http://schemas.microsoft.com/office/drawing/2014/main" id="{F24B1AC8-C346-C066-8312-EC4669007BC2}"/>
-              </a:ext>
-            </a:extLst>
-          </p:cNvPr>
+          <p:cNvPr id="2" name="标题 1"/>
           <p:cNvSpPr>
             <a:spLocks noGrp="1"/>
           </p:cNvSpPr>
@@ -4692,13 +4188,7 @@
       </p:sp>
       <p:sp>
         <p:nvSpPr>
-          <p:cNvPr id="3" name="内容占位符 2">
-            <a:extLst>
-              <a:ext uri="{FF2B5EF4-FFF2-40B4-BE49-F238E27FC236}">
-                <a16:creationId xmlns:a16="http://schemas.microsoft.com/office/drawing/2014/main" id="{48E70D3F-7BCE-F295-1DBC-CFC2BC54F02B}"/>
-              </a:ext>
-            </a:extLst>
-          </p:cNvPr>
+          <p:cNvPr id="3" name="内容占位符 2"/>
           <p:cNvSpPr>
             <a:spLocks noGrp="1"/>
           </p:cNvSpPr>
@@ -4794,11 +4284,6 @@
         </p:txBody>
       </p:sp>
     </p:spTree>
-    <p:extLst>
-      <p:ext uri="{BB962C8B-B14F-4D97-AF65-F5344CB8AC3E}">
-        <p14:creationId xmlns:p14="http://schemas.microsoft.com/office/powerpoint/2010/main" val="1210276616"/>
-      </p:ext>
-    </p:extLst>
   </p:cSld>
   <p:clrMapOvr>
     <a:masterClrMapping/>
@@ -4849,7 +4334,7 @@
     </a:clrScheme>
     <a:fontScheme name="Office">
       <a:majorFont>
-        <a:latin typeface="等线 Light" panose="020F0302020204030204"/>
+        <a:latin typeface="等线 Light"/>
         <a:ea typeface=""/>
         <a:cs typeface=""/>
         <a:font script="Jpan" typeface="游ゴシック Light"/>
@@ -4882,26 +4367,9 @@
         <a:font script="Viet" typeface="Times New Roman"/>
         <a:font script="Uigh" typeface="Microsoft Uighur"/>
         <a:font script="Geor" typeface="Sylfaen"/>
-        <a:font script="Armn" typeface="Arial"/>
-        <a:font script="Bugi" typeface="Leelawadee UI"/>
-        <a:font script="Bopo" typeface="Microsoft JhengHei"/>
-        <a:font script="Java" typeface="Javanese Text"/>
-        <a:font script="Lisu" typeface="Segoe UI"/>
-        <a:font script="Mymr" typeface="Myanmar Text"/>
-        <a:font script="Nkoo" typeface="Ebrima"/>
-        <a:font script="Olck" typeface="Nirmala UI"/>
-        <a:font script="Osma" typeface="Ebrima"/>
-        <a:font script="Phag" typeface="Phagspa"/>
-        <a:font script="Syrn" typeface="Estrangelo Edessa"/>
-        <a:font script="Syrj" typeface="Estrangelo Edessa"/>
-        <a:font script="Syre" typeface="Estrangelo Edessa"/>
-        <a:font script="Sora" typeface="Nirmala UI"/>
-        <a:font script="Tale" typeface="Microsoft Tai Le"/>
-        <a:font script="Talu" typeface="Microsoft New Tai Lue"/>
-        <a:font script="Tfng" typeface="Ebrima"/>
       </a:majorFont>
       <a:minorFont>
-        <a:latin typeface="等线" panose="020F0502020204030204"/>
+        <a:latin typeface="等线"/>
         <a:ea typeface=""/>
         <a:cs typeface=""/>
         <a:font script="Jpan" typeface="游ゴシック"/>
@@ -4934,23 +4402,6 @@
         <a:font script="Viet" typeface="Arial"/>
         <a:font script="Uigh" typeface="Microsoft Uighur"/>
         <a:font script="Geor" typeface="Sylfaen"/>
-        <a:font script="Armn" typeface="Arial"/>
-        <a:font script="Bugi" typeface="Leelawadee UI"/>
-        <a:font script="Bopo" typeface="Microsoft JhengHei"/>
-        <a:font script="Java" typeface="Javanese Text"/>
-        <a:font script="Lisu" typeface="Segoe UI"/>
-        <a:font script="Mymr" typeface="Myanmar Text"/>
-        <a:font script="Nkoo" typeface="Ebrima"/>
-        <a:font script="Olck" typeface="Nirmala UI"/>
-        <a:font script="Osma" typeface="Ebrima"/>
-        <a:font script="Phag" typeface="Phagspa"/>
-        <a:font script="Syrn" typeface="Estrangelo Edessa"/>
-        <a:font script="Syrj" typeface="Estrangelo Edessa"/>
-        <a:font script="Syre" typeface="Estrangelo Edessa"/>
-        <a:font script="Sora" typeface="Nirmala UI"/>
-        <a:font script="Tale" typeface="Microsoft Tai Le"/>
-        <a:font script="Talu" typeface="Microsoft New Tai Lue"/>
-        <a:font script="Tfng" typeface="Ebrima"/>
       </a:minorFont>
     </a:fontScheme>
     <a:fmtScheme name="Office">
@@ -5091,8 +4542,6 @@
       </a:bgFillStyleLst>
     </a:fmtScheme>
   </a:themeElements>
-  <a:objectDefaults/>
-  <a:extraClrSchemeLst/>
   <a:extLst>
     <a:ext uri="{05A4C25C-085E-4340-85A3-A5531E510DB2}">
       <thm15:themeFamily xmlns:thm15="http://schemas.microsoft.com/office/thememl/2012/main" name="Office Theme" id="{62F939B6-93AF-4DB8-9C6B-D6C7DFDC589F}" vid="{4A3C46E8-61CC-4603-A589-7422A47A8E4A}"/>

</xml_diff>